<commit_message>
Lab #2 slides, 1/22/18
</commit_message>
<xml_diff>
--- a/cs447tk_rec1_jan22.pptx
+++ b/cs447tk_rec1_jan22.pptx
@@ -12,19 +12,19 @@
     <p:sldId id="259" r:id="rId3"/>
     <p:sldId id="281" r:id="rId4"/>
     <p:sldId id="260" r:id="rId5"/>
-    <p:sldId id="261" r:id="rId6"/>
-    <p:sldId id="282" r:id="rId7"/>
-    <p:sldId id="283" r:id="rId8"/>
-    <p:sldId id="284" r:id="rId9"/>
-    <p:sldId id="285" r:id="rId10"/>
-    <p:sldId id="286" r:id="rId11"/>
-    <p:sldId id="287" r:id="rId12"/>
-    <p:sldId id="288" r:id="rId13"/>
-    <p:sldId id="289" r:id="rId14"/>
-    <p:sldId id="290" r:id="rId15"/>
-    <p:sldId id="291" r:id="rId16"/>
-    <p:sldId id="292" r:id="rId17"/>
-    <p:sldId id="293" r:id="rId18"/>
+    <p:sldId id="282" r:id="rId6"/>
+    <p:sldId id="283" r:id="rId7"/>
+    <p:sldId id="284" r:id="rId8"/>
+    <p:sldId id="285" r:id="rId9"/>
+    <p:sldId id="286" r:id="rId10"/>
+    <p:sldId id="287" r:id="rId11"/>
+    <p:sldId id="288" r:id="rId12"/>
+    <p:sldId id="289" r:id="rId13"/>
+    <p:sldId id="290" r:id="rId14"/>
+    <p:sldId id="291" r:id="rId15"/>
+    <p:sldId id="292" r:id="rId16"/>
+    <p:sldId id="293" r:id="rId17"/>
+    <p:sldId id="294" r:id="rId18"/>
   </p:sldIdLst>
   <p:sldSz cx="9144000" cy="6858000" type="screen4x3"/>
   <p:notesSz cx="6858000" cy="9144000"/>
@@ -240,7 +240,7 @@
           <a:p>
             <a:fld id="{79DACF82-7282-4538-9925-81D795D18BF0}" type="datetimeFigureOut">
               <a:rPr lang="en-US" smtClean="0"/>
-              <a:t>1/21/2018</a:t>
+              <a:t>1/22/2018</a:t>
             </a:fld>
             <a:endParaRPr lang="en-US"/>
           </a:p>
@@ -638,7 +638,7 @@
           <a:p>
             <a:fld id="{7880F47B-3C72-48E5-9CD2-8B9AE0E9AFF7}" type="datetimeFigureOut">
               <a:rPr lang="en-US" smtClean="0"/>
-              <a:t>1/21/2018</a:t>
+              <a:t>1/22/2018</a:t>
             </a:fld>
             <a:endParaRPr lang="en-US"/>
           </a:p>
@@ -808,7 +808,7 @@
           <a:p>
             <a:fld id="{7880F47B-3C72-48E5-9CD2-8B9AE0E9AFF7}" type="datetimeFigureOut">
               <a:rPr lang="en-US" smtClean="0"/>
-              <a:t>1/21/2018</a:t>
+              <a:t>1/22/2018</a:t>
             </a:fld>
             <a:endParaRPr lang="en-US"/>
           </a:p>
@@ -988,7 +988,7 @@
           <a:p>
             <a:fld id="{7880F47B-3C72-48E5-9CD2-8B9AE0E9AFF7}" type="datetimeFigureOut">
               <a:rPr lang="en-US" smtClean="0"/>
-              <a:t>1/21/2018</a:t>
+              <a:t>1/22/2018</a:t>
             </a:fld>
             <a:endParaRPr lang="en-US"/>
           </a:p>
@@ -1158,7 +1158,7 @@
           <a:p>
             <a:fld id="{7880F47B-3C72-48E5-9CD2-8B9AE0E9AFF7}" type="datetimeFigureOut">
               <a:rPr lang="en-US" smtClean="0"/>
-              <a:t>1/21/2018</a:t>
+              <a:t>1/22/2018</a:t>
             </a:fld>
             <a:endParaRPr lang="en-US"/>
           </a:p>
@@ -1402,7 +1402,7 @@
           <a:p>
             <a:fld id="{7880F47B-3C72-48E5-9CD2-8B9AE0E9AFF7}" type="datetimeFigureOut">
               <a:rPr lang="en-US" smtClean="0"/>
-              <a:t>1/21/2018</a:t>
+              <a:t>1/22/2018</a:t>
             </a:fld>
             <a:endParaRPr lang="en-US"/>
           </a:p>
@@ -1634,7 +1634,7 @@
           <a:p>
             <a:fld id="{7880F47B-3C72-48E5-9CD2-8B9AE0E9AFF7}" type="datetimeFigureOut">
               <a:rPr lang="en-US" smtClean="0"/>
-              <a:t>1/21/2018</a:t>
+              <a:t>1/22/2018</a:t>
             </a:fld>
             <a:endParaRPr lang="en-US"/>
           </a:p>
@@ -2001,7 +2001,7 @@
           <a:p>
             <a:fld id="{7880F47B-3C72-48E5-9CD2-8B9AE0E9AFF7}" type="datetimeFigureOut">
               <a:rPr lang="en-US" smtClean="0"/>
-              <a:t>1/21/2018</a:t>
+              <a:t>1/22/2018</a:t>
             </a:fld>
             <a:endParaRPr lang="en-US"/>
           </a:p>
@@ -2119,7 +2119,7 @@
           <a:p>
             <a:fld id="{7880F47B-3C72-48E5-9CD2-8B9AE0E9AFF7}" type="datetimeFigureOut">
               <a:rPr lang="en-US" smtClean="0"/>
-              <a:t>1/21/2018</a:t>
+              <a:t>1/22/2018</a:t>
             </a:fld>
             <a:endParaRPr lang="en-US"/>
           </a:p>
@@ -2214,7 +2214,7 @@
           <a:p>
             <a:fld id="{7880F47B-3C72-48E5-9CD2-8B9AE0E9AFF7}" type="datetimeFigureOut">
               <a:rPr lang="en-US" smtClean="0"/>
-              <a:t>1/21/2018</a:t>
+              <a:t>1/22/2018</a:t>
             </a:fld>
             <a:endParaRPr lang="en-US"/>
           </a:p>
@@ -2491,7 +2491,7 @@
           <a:p>
             <a:fld id="{7880F47B-3C72-48E5-9CD2-8B9AE0E9AFF7}" type="datetimeFigureOut">
               <a:rPr lang="en-US" smtClean="0"/>
-              <a:t>1/21/2018</a:t>
+              <a:t>1/22/2018</a:t>
             </a:fld>
             <a:endParaRPr lang="en-US"/>
           </a:p>
@@ -2748,7 +2748,7 @@
           <a:p>
             <a:fld id="{7880F47B-3C72-48E5-9CD2-8B9AE0E9AFF7}" type="datetimeFigureOut">
               <a:rPr lang="en-US" smtClean="0"/>
-              <a:t>1/21/2018</a:t>
+              <a:t>1/22/2018</a:t>
             </a:fld>
             <a:endParaRPr lang="en-US"/>
           </a:p>
@@ -2961,7 +2961,7 @@
           <a:p>
             <a:fld id="{7880F47B-3C72-48E5-9CD2-8B9AE0E9AFF7}" type="datetimeFigureOut">
               <a:rPr lang="en-US" smtClean="0"/>
-              <a:t>1/21/2018</a:t>
+              <a:t>1/22/2018</a:t>
             </a:fld>
             <a:endParaRPr lang="en-US"/>
           </a:p>
@@ -3393,7 +3393,7 @@
                   <a:srgbClr val="002060"/>
                 </a:solidFill>
               </a:rPr>
-              <a:t>CS1501 Recitation #1: 1/22/18</a:t>
+              <a:t>CS447 Recitation #1: 1/22/18</a:t>
             </a:r>
           </a:p>
         </p:txBody>
@@ -3452,7 +3452,7 @@
             </a:pPr>
             <a:r>
               <a:rPr lang="en-US" sz="2400" dirty="0"/>
-              <a:t>Review of Lab #1</a:t>
+              <a:t>Review of Lab #2</a:t>
             </a:r>
           </a:p>
         </p:txBody>
@@ -3496,7 +3496,7 @@
               <a:rPr lang="en-US" sz="2400" dirty="0">
                 <a:hlinkClick r:id="rId2"/>
               </a:rPr>
-              <a:t>https://github.com/kc13/CS447JB</a:t>
+              <a:t>https://github.com/kc13/CS447TK</a:t>
             </a:r>
             <a:endParaRPr lang="en-US" sz="2400" dirty="0"/>
           </a:p>
@@ -3541,14 +3541,14 @@
         <p:spPr>
           <a:xfrm>
             <a:off x="0" y="0"/>
-            <a:ext cx="8134066" cy="523220"/>
+            <a:ext cx="8541834" cy="523220"/>
           </a:xfrm>
           <a:prstGeom prst="rect">
             <a:avLst/>
           </a:prstGeom>
         </p:spPr>
         <p:txBody>
-          <a:bodyPr rtlCol="0">
+          <a:bodyPr wrap="square" rtlCol="0">
             <a:spAutoFit/>
           </a:bodyPr>
           <a:lstStyle/>
@@ -3559,30 +3559,46 @@
                   <a:srgbClr val="002060"/>
                 </a:solidFill>
               </a:rPr>
-              <a:t>Lab #1 Highlights: Running a </a:t>
-            </a:r>
-            <a:r>
-              <a:rPr lang="en-US" sz="2800" dirty="0" err="1">
-                <a:solidFill>
-                  <a:srgbClr val="002060"/>
-                </a:solidFill>
-              </a:rPr>
-              <a:t>syscall</a:t>
-            </a:r>
-            <a:endParaRPr lang="en-US" sz="2800" dirty="0">
-              <a:solidFill>
-                <a:srgbClr val="002060"/>
-              </a:solidFill>
-            </a:endParaRPr>
-          </a:p>
-        </p:txBody>
-      </p:sp>
-      <p:sp>
-        <p:nvSpPr>
-          <p:cNvPr id="2" name="TextBox 1">
+              <a:t>Lab #2: Higher/Lower Game: General organization + tips</a:t>
+            </a:r>
+          </a:p>
+        </p:txBody>
+      </p:sp>
+      <p:pic>
+        <p:nvPicPr>
+          <p:cNvPr id="2" name="Picture 1">
             <a:extLst>
               <a:ext uri="{FF2B5EF4-FFF2-40B4-BE49-F238E27FC236}">
-                <a16:creationId xmlns:a16="http://schemas.microsoft.com/office/drawing/2014/main" id="{77F0C7F9-5856-45E7-924B-0E62D8886592}"/>
+                <a16:creationId xmlns:a16="http://schemas.microsoft.com/office/drawing/2014/main" id="{4CF7D8DA-01BD-44AD-ADAD-DFD366447601}"/>
+              </a:ext>
+            </a:extLst>
+          </p:cNvPr>
+          <p:cNvPicPr>
+            <a:picLocks noChangeAspect="1"/>
+          </p:cNvPicPr>
+          <p:nvPr/>
+        </p:nvPicPr>
+        <p:blipFill rotWithShape="1">
+          <a:blip r:embed="rId2"/>
+          <a:srcRect b="47651"/>
+          <a:stretch/>
+        </p:blipFill>
+        <p:spPr>
+          <a:xfrm>
+            <a:off x="182880" y="1235442"/>
+            <a:ext cx="4389120" cy="2511367"/>
+          </a:xfrm>
+          <a:prstGeom prst="rect">
+            <a:avLst/>
+          </a:prstGeom>
+        </p:spPr>
+      </p:pic>
+      <p:sp>
+        <p:nvSpPr>
+          <p:cNvPr id="4" name="TextBox 3">
+            <a:extLst>
+              <a:ext uri="{FF2B5EF4-FFF2-40B4-BE49-F238E27FC236}">
+                <a16:creationId xmlns:a16="http://schemas.microsoft.com/office/drawing/2014/main" id="{3C4649C9-5CF8-4A48-A40D-4D248FE16D2C}"/>
               </a:ext>
             </a:extLst>
           </p:cNvPr>
@@ -3591,8 +3607,8 @@
         </p:nvSpPr>
         <p:spPr>
           <a:xfrm>
-            <a:off x="401445" y="838200"/>
-            <a:ext cx="7342329" cy="2677656"/>
+            <a:off x="4761571" y="838200"/>
+            <a:ext cx="3780263" cy="4955203"/>
           </a:xfrm>
           <a:prstGeom prst="rect">
             <a:avLst/>
@@ -3606,12 +3622,8 @@
           <a:lstStyle/>
           <a:p>
             <a:r>
-              <a:rPr lang="en-US" sz="2400" dirty="0" err="1"/>
-              <a:t>Syscall</a:t>
-            </a:r>
-            <a:r>
               <a:rPr lang="en-US" sz="2400" dirty="0"/>
-              <a:t> = System call</a:t>
+              <a:t>There are several text messages to be printed. </a:t>
             </a:r>
           </a:p>
           <a:p>
@@ -3623,8 +3635,37 @@
               <a:buChar char="•"/>
             </a:pPr>
             <a:r>
-              <a:rPr lang="en-US" sz="2400" dirty="0"/>
-              <a:t>We use them in Mars whenever we want to simulate an operation that would require the operating system’s help. </a:t>
+              <a:rPr lang="en-US" sz="2200" dirty="0"/>
+              <a:t>These will need to be created in the </a:t>
+            </a:r>
+            <a:r>
+              <a:rPr lang="en-US" sz="2200" dirty="0">
+                <a:latin typeface="Consolas" panose="020B0609020204030204" pitchFamily="49" charset="0"/>
+                <a:cs typeface="Consolas" panose="020B0609020204030204" pitchFamily="49" charset="0"/>
+              </a:rPr>
+              <a:t>.data </a:t>
+            </a:r>
+            <a:r>
+              <a:rPr lang="en-US" sz="2200" dirty="0"/>
+              <a:t>section, using labels and the </a:t>
+            </a:r>
+            <a:r>
+              <a:rPr lang="en-US" sz="2200" dirty="0">
+                <a:latin typeface="Consolas" panose="020B0609020204030204" pitchFamily="49" charset="0"/>
+                <a:cs typeface="Consolas" panose="020B0609020204030204" pitchFamily="49" charset="0"/>
+              </a:rPr>
+              <a:t>.</a:t>
+            </a:r>
+            <a:r>
+              <a:rPr lang="en-US" sz="2200" dirty="0" err="1">
+                <a:latin typeface="Consolas" panose="020B0609020204030204" pitchFamily="49" charset="0"/>
+                <a:cs typeface="Consolas" panose="020B0609020204030204" pitchFamily="49" charset="0"/>
+              </a:rPr>
+              <a:t>asciiz</a:t>
+            </a:r>
+            <a:r>
+              <a:rPr lang="en-US" sz="2200" dirty="0"/>
+              <a:t> directive.</a:t>
             </a:r>
           </a:p>
           <a:p>
@@ -3632,7 +3673,7 @@
               <a:buFont typeface="Arial" panose="020B0604020202020204" pitchFamily="34" charset="0"/>
               <a:buChar char="•"/>
             </a:pPr>
-            <a:endParaRPr lang="en-US" sz="2400" dirty="0"/>
+            <a:endParaRPr lang="en-US" sz="2200" dirty="0"/>
           </a:p>
           <a:p>
             <a:pPr marL="342900" indent="-342900">
@@ -3640,24 +3681,42 @@
               <a:buChar char="•"/>
             </a:pPr>
             <a:r>
-              <a:rPr lang="en-US" sz="2400" dirty="0"/>
-              <a:t>Most typical </a:t>
-            </a:r>
-            <a:r>
-              <a:rPr lang="en-US" sz="2400" dirty="0" err="1"/>
-              <a:t>syscalls</a:t>
-            </a:r>
-            <a:r>
-              <a:rPr lang="en-US" sz="2400" dirty="0"/>
-              <a:t>: Input and Output</a:t>
-            </a:r>
+              <a:rPr lang="en-US" sz="2200" u="sng" dirty="0"/>
+              <a:t>Tip</a:t>
+            </a:r>
+            <a:r>
+              <a:rPr lang="en-US" sz="2200" dirty="0"/>
+              <a:t>: To ensure that a line break appears after a message, end the message with “\n” when you specify it in the </a:t>
+            </a:r>
+            <a:r>
+              <a:rPr lang="en-US" sz="2200" dirty="0">
+                <a:latin typeface="Consolas" panose="020B0609020204030204" pitchFamily="49" charset="0"/>
+                <a:cs typeface="Consolas" panose="020B0609020204030204" pitchFamily="49" charset="0"/>
+              </a:rPr>
+              <a:t>.data </a:t>
+            </a:r>
+            <a:r>
+              <a:rPr lang="en-US" sz="2200" dirty="0"/>
+              <a:t>section.</a:t>
+            </a:r>
+            <a:endParaRPr lang="en-US" sz="2400" dirty="0"/>
+          </a:p>
+          <a:p>
+            <a:r>
+              <a:rPr lang="en-US" sz="2400" dirty="0">
+                <a:latin typeface="Consolas" panose="020B0609020204030204" pitchFamily="49" charset="0"/>
+                <a:cs typeface="Consolas" panose="020B0609020204030204" pitchFamily="49" charset="0"/>
+              </a:rPr>
+              <a:t> </a:t>
+            </a:r>
+            <a:endParaRPr lang="en-US" sz="2400" dirty="0"/>
           </a:p>
         </p:txBody>
       </p:sp>
     </p:spTree>
     <p:extLst>
       <p:ext uri="{BB962C8B-B14F-4D97-AF65-F5344CB8AC3E}">
-        <p14:creationId xmlns:p14="http://schemas.microsoft.com/office/powerpoint/2010/main" val="1980715108"/>
+        <p14:creationId xmlns:p14="http://schemas.microsoft.com/office/powerpoint/2010/main" val="3084481459"/>
       </p:ext>
     </p:extLst>
   </p:cSld>
@@ -3693,14 +3752,14 @@
         <p:spPr>
           <a:xfrm>
             <a:off x="0" y="0"/>
-            <a:ext cx="8134066" cy="523220"/>
+            <a:ext cx="8541834" cy="523220"/>
           </a:xfrm>
           <a:prstGeom prst="rect">
             <a:avLst/>
           </a:prstGeom>
         </p:spPr>
         <p:txBody>
-          <a:bodyPr rtlCol="0">
+          <a:bodyPr wrap="square" rtlCol="0">
             <a:spAutoFit/>
           </a:bodyPr>
           <a:lstStyle/>
@@ -3711,30 +3770,46 @@
                   <a:srgbClr val="002060"/>
                 </a:solidFill>
               </a:rPr>
-              <a:t>Lab #1 Highlights: Running a </a:t>
-            </a:r>
-            <a:r>
-              <a:rPr lang="en-US" sz="2800" dirty="0" err="1">
-                <a:solidFill>
-                  <a:srgbClr val="002060"/>
-                </a:solidFill>
-              </a:rPr>
-              <a:t>syscall</a:t>
-            </a:r>
-            <a:endParaRPr lang="en-US" sz="2800" dirty="0">
-              <a:solidFill>
-                <a:srgbClr val="002060"/>
-              </a:solidFill>
-            </a:endParaRPr>
-          </a:p>
-        </p:txBody>
-      </p:sp>
-      <p:sp>
-        <p:nvSpPr>
-          <p:cNvPr id="2" name="TextBox 1">
+              <a:t>Lab #2: Higher/Lower Game: General organization + tips</a:t>
+            </a:r>
+          </a:p>
+        </p:txBody>
+      </p:sp>
+      <p:pic>
+        <p:nvPicPr>
+          <p:cNvPr id="2" name="Picture 1">
             <a:extLst>
               <a:ext uri="{FF2B5EF4-FFF2-40B4-BE49-F238E27FC236}">
-                <a16:creationId xmlns:a16="http://schemas.microsoft.com/office/drawing/2014/main" id="{77F0C7F9-5856-45E7-924B-0E62D8886592}"/>
+                <a16:creationId xmlns:a16="http://schemas.microsoft.com/office/drawing/2014/main" id="{4CF7D8DA-01BD-44AD-ADAD-DFD366447601}"/>
+              </a:ext>
+            </a:extLst>
+          </p:cNvPr>
+          <p:cNvPicPr>
+            <a:picLocks noChangeAspect="1"/>
+          </p:cNvPicPr>
+          <p:nvPr/>
+        </p:nvPicPr>
+        <p:blipFill rotWithShape="1">
+          <a:blip r:embed="rId2"/>
+          <a:srcRect b="47651"/>
+          <a:stretch/>
+        </p:blipFill>
+        <p:spPr>
+          <a:xfrm>
+            <a:off x="182880" y="1235442"/>
+            <a:ext cx="4389120" cy="2511367"/>
+          </a:xfrm>
+          <a:prstGeom prst="rect">
+            <a:avLst/>
+          </a:prstGeom>
+        </p:spPr>
+      </p:pic>
+      <p:sp>
+        <p:nvSpPr>
+          <p:cNvPr id="4" name="TextBox 3">
+            <a:extLst>
+              <a:ext uri="{FF2B5EF4-FFF2-40B4-BE49-F238E27FC236}">
+                <a16:creationId xmlns:a16="http://schemas.microsoft.com/office/drawing/2014/main" id="{3C4649C9-5CF8-4A48-A40D-4D248FE16D2C}"/>
               </a:ext>
             </a:extLst>
           </p:cNvPr>
@@ -3743,8 +3818,8 @@
         </p:nvSpPr>
         <p:spPr>
           <a:xfrm>
-            <a:off x="401445" y="838200"/>
-            <a:ext cx="7342329" cy="5262979"/>
+            <a:off x="4761571" y="525079"/>
+            <a:ext cx="3780263" cy="7909858"/>
           </a:xfrm>
           <a:prstGeom prst="rect">
             <a:avLst/>
@@ -3758,16 +3833,12 @@
           <a:lstStyle/>
           <a:p>
             <a:r>
-              <a:rPr lang="en-US" sz="2400" dirty="0" err="1"/>
-              <a:t>Syscall</a:t>
-            </a:r>
-            <a:r>
-              <a:rPr lang="en-US" sz="2400" dirty="0"/>
-              <a:t> = System call</a:t>
-            </a:r>
-          </a:p>
-          <a:p>
-            <a:endParaRPr lang="en-US" sz="2400" dirty="0"/>
+              <a:rPr lang="en-US" sz="2000" dirty="0"/>
+              <a:t>At the start of the program, you will need to generate a random number:</a:t>
+            </a:r>
+          </a:p>
+          <a:p>
+            <a:endParaRPr lang="en-US" sz="2000" dirty="0"/>
           </a:p>
           <a:p>
             <a:pPr marL="342900" indent="-342900">
@@ -3775,79 +3846,188 @@
               <a:buChar char="•"/>
             </a:pPr>
             <a:r>
-              <a:rPr lang="en-US" sz="2400" dirty="0"/>
-              <a:t>We use them in Mars whenever we want to simulate an operation that would require the operating system’s help. </a:t>
-            </a:r>
-          </a:p>
-          <a:p>
-            <a:endParaRPr lang="en-US" sz="2400" dirty="0"/>
+              <a:rPr lang="en-US" sz="2000" dirty="0">
+                <a:solidFill>
+                  <a:srgbClr val="002060"/>
+                </a:solidFill>
+              </a:rPr>
+              <a:t>First, you will get the system time (</a:t>
+            </a:r>
+            <a:r>
+              <a:rPr lang="en-US" sz="2000" dirty="0" err="1">
+                <a:solidFill>
+                  <a:srgbClr val="002060"/>
+                </a:solidFill>
+              </a:rPr>
+              <a:t>syscall</a:t>
+            </a:r>
+            <a:r>
+              <a:rPr lang="en-US" sz="2000" dirty="0">
+                <a:solidFill>
+                  <a:srgbClr val="002060"/>
+                </a:solidFill>
+              </a:rPr>
+              <a:t> 30).</a:t>
+            </a:r>
           </a:p>
           <a:p>
             <a:pPr marL="342900" indent="-342900">
               <a:buFont typeface="Arial" panose="020B0604020202020204" pitchFamily="34" charset="0"/>
               <a:buChar char="•"/>
             </a:pPr>
-            <a:r>
-              <a:rPr lang="en-US" sz="2400" dirty="0"/>
-              <a:t>Most typical </a:t>
-            </a:r>
-            <a:r>
-              <a:rPr lang="en-US" sz="2400" dirty="0" err="1"/>
-              <a:t>syscalls</a:t>
-            </a:r>
-            <a:r>
-              <a:rPr lang="en-US" sz="2400" dirty="0"/>
-              <a:t>: Input and Output</a:t>
-            </a:r>
+            <a:endParaRPr lang="en-US" sz="2000" dirty="0">
+              <a:solidFill>
+                <a:srgbClr val="002060"/>
+              </a:solidFill>
+            </a:endParaRPr>
           </a:p>
           <a:p>
             <a:pPr marL="342900" indent="-342900">
               <a:buFont typeface="Arial" panose="020B0604020202020204" pitchFamily="34" charset="0"/>
               <a:buChar char="•"/>
             </a:pPr>
-            <a:endParaRPr lang="en-US" sz="2400" dirty="0"/>
-          </a:p>
-          <a:p>
-            <a:pPr marL="342900" indent="-342900">
+            <a:r>
+              <a:rPr lang="en-US" sz="2000" dirty="0">
+                <a:solidFill>
+                  <a:srgbClr val="002060"/>
+                </a:solidFill>
+              </a:rPr>
+              <a:t>Second, you will use the lower order bits of the system time as a seed to initialize the random number generator (RNG); this is </a:t>
+            </a:r>
+            <a:r>
+              <a:rPr lang="en-US" sz="2000" dirty="0" err="1">
+                <a:solidFill>
+                  <a:srgbClr val="002060"/>
+                </a:solidFill>
+              </a:rPr>
+              <a:t>syscall</a:t>
+            </a:r>
+            <a:r>
+              <a:rPr lang="en-US" sz="2000" dirty="0">
+                <a:solidFill>
+                  <a:srgbClr val="002060"/>
+                </a:solidFill>
+              </a:rPr>
+              <a:t> 40.</a:t>
+            </a:r>
+          </a:p>
+          <a:p>
+            <a:pPr marL="800100" lvl="1" indent="-342900">
               <a:buFont typeface="Arial" panose="020B0604020202020204" pitchFamily="34" charset="0"/>
               <a:buChar char="•"/>
             </a:pPr>
             <a:r>
-              <a:rPr lang="en-US" sz="2400" dirty="0"/>
-              <a:t>In a sense, you can think of them as functions that you did not write yourself. </a:t>
-            </a:r>
-          </a:p>
-          <a:p>
-            <a:pPr marL="342900" indent="-342900">
+              <a:rPr lang="en-US" sz="2000" dirty="0">
+                <a:solidFill>
+                  <a:srgbClr val="002060"/>
+                </a:solidFill>
+              </a:rPr>
+              <a:t>Any ID # for the RNG is fine.</a:t>
+            </a:r>
+          </a:p>
+          <a:p>
+            <a:pPr marL="800100" lvl="1" indent="-342900">
               <a:buFont typeface="Arial" panose="020B0604020202020204" pitchFamily="34" charset="0"/>
               <a:buChar char="•"/>
             </a:pPr>
-            <a:endParaRPr lang="en-US" sz="2400" dirty="0"/>
-          </a:p>
-          <a:p>
-            <a:pPr marL="342900" indent="-342900">
+            <a:r>
+              <a:rPr lang="en-US" sz="2000" dirty="0">
+                <a:solidFill>
+                  <a:srgbClr val="002060"/>
+                </a:solidFill>
+              </a:rPr>
+              <a:t>Note </a:t>
+            </a:r>
+            <a:r>
+              <a:rPr lang="en-US" sz="2000" dirty="0" err="1">
+                <a:solidFill>
+                  <a:srgbClr val="002060"/>
+                </a:solidFill>
+              </a:rPr>
+              <a:t>syscall</a:t>
+            </a:r>
+            <a:r>
+              <a:rPr lang="en-US" sz="2000" dirty="0">
+                <a:solidFill>
+                  <a:srgbClr val="002060"/>
+                </a:solidFill>
+              </a:rPr>
+              <a:t> 30 will return the lower order bits in $a0, but </a:t>
+            </a:r>
+            <a:r>
+              <a:rPr lang="en-US" sz="2000" dirty="0" err="1">
+                <a:solidFill>
+                  <a:srgbClr val="002060"/>
+                </a:solidFill>
+              </a:rPr>
+              <a:t>syscall</a:t>
+            </a:r>
+            <a:r>
+              <a:rPr lang="en-US" sz="2000" dirty="0">
+                <a:solidFill>
+                  <a:srgbClr val="002060"/>
+                </a:solidFill>
+              </a:rPr>
+              <a:t> 40 will expect this number to be in $a1, because the ID is in $a0.</a:t>
+            </a:r>
+          </a:p>
+          <a:p>
+            <a:pPr marL="800100" lvl="1" indent="-342900">
               <a:buFont typeface="Arial" panose="020B0604020202020204" pitchFamily="34" charset="0"/>
               <a:buChar char="•"/>
             </a:pPr>
-            <a:r>
-              <a:rPr lang="en-US" sz="2400" dirty="0"/>
-              <a:t>They will often require a “code” (to select the </a:t>
-            </a:r>
-            <a:r>
-              <a:rPr lang="en-US" sz="2400" dirty="0" err="1"/>
-              <a:t>syscall</a:t>
-            </a:r>
-            <a:r>
-              <a:rPr lang="en-US" sz="2400" dirty="0"/>
-              <a:t> you want) and an “argument” (analogous to a function argument)</a:t>
-            </a:r>
+            <a:endParaRPr lang="en-US" sz="2000" dirty="0">
+              <a:solidFill>
+                <a:srgbClr val="002060"/>
+              </a:solidFill>
+            </a:endParaRPr>
+          </a:p>
+          <a:p>
+            <a:pPr marL="800100" lvl="1" indent="-342900">
+              <a:buFont typeface="Arial" panose="020B0604020202020204" pitchFamily="34" charset="0"/>
+              <a:buChar char="•"/>
+            </a:pPr>
+            <a:endParaRPr lang="en-US" sz="2200" dirty="0">
+              <a:solidFill>
+                <a:srgbClr val="002060"/>
+              </a:solidFill>
+            </a:endParaRPr>
+          </a:p>
+          <a:p>
+            <a:pPr marL="800100" lvl="1" indent="-342900">
+              <a:buFont typeface="Arial" panose="020B0604020202020204" pitchFamily="34" charset="0"/>
+              <a:buChar char="•"/>
+            </a:pPr>
+            <a:endParaRPr lang="en-US" sz="2200" dirty="0">
+              <a:solidFill>
+                <a:srgbClr val="002060"/>
+              </a:solidFill>
+            </a:endParaRPr>
+          </a:p>
+          <a:p>
+            <a:pPr marL="800100" lvl="1" indent="-342900">
+              <a:buFont typeface="Arial" panose="020B0604020202020204" pitchFamily="34" charset="0"/>
+              <a:buChar char="•"/>
+            </a:pPr>
+            <a:endParaRPr lang="en-US" sz="2200" dirty="0">
+              <a:solidFill>
+                <a:srgbClr val="002060"/>
+              </a:solidFill>
+            </a:endParaRPr>
+          </a:p>
+          <a:p>
+            <a:endParaRPr lang="en-US" sz="2200" dirty="0">
+              <a:solidFill>
+                <a:srgbClr val="002060"/>
+              </a:solidFill>
+            </a:endParaRPr>
           </a:p>
         </p:txBody>
       </p:sp>
     </p:spTree>
     <p:extLst>
       <p:ext uri="{BB962C8B-B14F-4D97-AF65-F5344CB8AC3E}">
-        <p14:creationId xmlns:p14="http://schemas.microsoft.com/office/powerpoint/2010/main" val="2576450082"/>
+        <p14:creationId xmlns:p14="http://schemas.microsoft.com/office/powerpoint/2010/main" val="1829630167"/>
       </p:ext>
     </p:extLst>
   </p:cSld>
@@ -3883,7 +4063,7 @@
         <p:spPr>
           <a:xfrm>
             <a:off x="0" y="0"/>
-            <a:ext cx="9054790" cy="523220"/>
+            <a:ext cx="8541834" cy="523220"/>
           </a:xfrm>
           <a:prstGeom prst="rect">
             <a:avLst/>
@@ -3901,30 +4081,17 @@
                   <a:srgbClr val="002060"/>
                 </a:solidFill>
               </a:rPr>
-              <a:t>Lab #1 Highlights: Typical procedure for running a </a:t>
-            </a:r>
-            <a:r>
-              <a:rPr lang="en-US" sz="2800" dirty="0" err="1">
-                <a:solidFill>
-                  <a:srgbClr val="002060"/>
-                </a:solidFill>
-              </a:rPr>
-              <a:t>syscall</a:t>
-            </a:r>
-            <a:endParaRPr lang="en-US" sz="2800" dirty="0">
-              <a:solidFill>
-                <a:srgbClr val="002060"/>
-              </a:solidFill>
-            </a:endParaRPr>
+              <a:t>Lab #2: Higher/Lower Game: General organization + tips</a:t>
+            </a:r>
           </a:p>
         </p:txBody>
       </p:sp>
       <p:pic>
         <p:nvPicPr>
-          <p:cNvPr id="4" name="Picture 3" descr="MARS 4.5 Help">
+          <p:cNvPr id="2" name="Picture 1">
             <a:extLst>
               <a:ext uri="{FF2B5EF4-FFF2-40B4-BE49-F238E27FC236}">
-                <a16:creationId xmlns:a16="http://schemas.microsoft.com/office/drawing/2014/main" id="{11AD8CA7-65DE-41DB-AB48-49E84B6900FE}"/>
+                <a16:creationId xmlns:a16="http://schemas.microsoft.com/office/drawing/2014/main" id="{4CF7D8DA-01BD-44AD-ADAD-DFD366447601}"/>
               </a:ext>
             </a:extLst>
           </p:cNvPr>
@@ -3934,20 +4101,14 @@
           <p:nvPr/>
         </p:nvPicPr>
         <p:blipFill rotWithShape="1">
-          <a:blip r:embed="rId2">
-            <a:extLst>
-              <a:ext uri="{28A0092B-C50C-407E-A947-70E740481C1C}">
-                <a14:useLocalDpi xmlns:a14="http://schemas.microsoft.com/office/drawing/2010/main" val="0"/>
-              </a:ext>
-            </a:extLst>
-          </a:blip>
-          <a:srcRect t="26744" b="49162"/>
+          <a:blip r:embed="rId2"/>
+          <a:srcRect b="47651"/>
           <a:stretch/>
         </p:blipFill>
         <p:spPr>
           <a:xfrm>
-            <a:off x="181605" y="838200"/>
-            <a:ext cx="7621064" cy="1377176"/>
+            <a:off x="182880" y="1235442"/>
+            <a:ext cx="4389120" cy="2511367"/>
           </a:xfrm>
           <a:prstGeom prst="rect">
             <a:avLst/>
@@ -3956,10 +4117,10 @@
       </p:pic>
       <p:sp>
         <p:nvSpPr>
-          <p:cNvPr id="6" name="TextBox 5">
+          <p:cNvPr id="4" name="TextBox 3">
             <a:extLst>
               <a:ext uri="{FF2B5EF4-FFF2-40B4-BE49-F238E27FC236}">
-                <a16:creationId xmlns:a16="http://schemas.microsoft.com/office/drawing/2014/main" id="{18666A00-54AD-4942-8796-27F7FC408D60}"/>
+                <a16:creationId xmlns:a16="http://schemas.microsoft.com/office/drawing/2014/main" id="{3C4649C9-5CF8-4A48-A40D-4D248FE16D2C}"/>
               </a:ext>
             </a:extLst>
           </p:cNvPr>
@@ -3968,8 +4129,8 @@
         </p:nvSpPr>
         <p:spPr>
           <a:xfrm>
-            <a:off x="457200" y="2754350"/>
-            <a:ext cx="7621064" cy="1015663"/>
+            <a:off x="4761571" y="525079"/>
+            <a:ext cx="3780263" cy="5139869"/>
           </a:xfrm>
           <a:prstGeom prst="rect">
             <a:avLst/>
@@ -3982,46 +4143,110 @@
           </a:bodyPr>
           <a:lstStyle/>
           <a:p>
-            <a:pPr marL="457200" indent="-457200">
-              <a:buFont typeface="+mj-lt"/>
-              <a:buAutoNum type="arabicPeriod"/>
+            <a:r>
+              <a:rPr lang="en-US" sz="2000" dirty="0"/>
+              <a:t>At the start of the program, you will need to generate a random number:</a:t>
+            </a:r>
+          </a:p>
+          <a:p>
+            <a:endParaRPr lang="en-US" sz="2000" dirty="0"/>
+          </a:p>
+          <a:p>
+            <a:pPr marL="342900" indent="-342900">
+              <a:buFont typeface="Arial" panose="020B0604020202020204" pitchFamily="34" charset="0"/>
+              <a:buChar char="•"/>
             </a:pPr>
             <a:r>
-              <a:rPr lang="en-US" sz="2000" dirty="0"/>
-              <a:t>Find the service you wish to use in the “</a:t>
-            </a:r>
-            <a:r>
-              <a:rPr lang="en-US" sz="2000" dirty="0" err="1"/>
-              <a:t>syscalls</a:t>
-            </a:r>
-            <a:r>
-              <a:rPr lang="en-US" sz="2000" dirty="0"/>
-              <a:t>” table.</a:t>
-            </a:r>
-          </a:p>
-          <a:p>
-            <a:pPr marL="457200" indent="-457200">
-              <a:buFont typeface="+mj-lt"/>
-              <a:buAutoNum type="arabicPeriod"/>
+              <a:rPr lang="en-US" sz="2000" dirty="0" err="1">
+                <a:solidFill>
+                  <a:srgbClr val="002060"/>
+                </a:solidFill>
+              </a:rPr>
+              <a:t>Syscall</a:t>
+            </a:r>
+            <a:r>
+              <a:rPr lang="en-US" sz="2000" dirty="0">
+                <a:solidFill>
+                  <a:srgbClr val="002060"/>
+                </a:solidFill>
+              </a:rPr>
+              <a:t> 42 can be used to generate the random integer. </a:t>
+            </a:r>
+          </a:p>
+          <a:p>
+            <a:pPr marL="800100" lvl="1" indent="-342900">
+              <a:buFont typeface="Arial" panose="020B0604020202020204" pitchFamily="34" charset="0"/>
+              <a:buChar char="•"/>
             </a:pPr>
-            <a:endParaRPr lang="en-US" sz="2000" dirty="0"/>
-          </a:p>
-          <a:p>
-            <a:pPr marL="457200" indent="-457200">
-              <a:buFont typeface="+mj-lt"/>
-              <a:buAutoNum type="arabicPeriod"/>
+            <a:r>
+              <a:rPr lang="en-US" sz="2000" dirty="0">
+                <a:solidFill>
+                  <a:srgbClr val="002060"/>
+                </a:solidFill>
+              </a:rPr>
+              <a:t>Be sure to give it the same ID # you assigned to the RNG. </a:t>
+            </a:r>
+          </a:p>
+          <a:p>
+            <a:pPr marL="800100" lvl="1" indent="-342900">
+              <a:buFont typeface="Arial" panose="020B0604020202020204" pitchFamily="34" charset="0"/>
+              <a:buChar char="•"/>
             </a:pPr>
             <a:r>
-              <a:rPr lang="en-US" sz="2000" dirty="0"/>
-              <a:t>Make note of the code and any required argument.</a:t>
-            </a:r>
+              <a:rPr lang="en-US" sz="2000" dirty="0">
+                <a:solidFill>
+                  <a:srgbClr val="002060"/>
+                </a:solidFill>
+              </a:rPr>
+              <a:t>Note that the upper bound is exclusive (so 10, in this case)</a:t>
+            </a:r>
+          </a:p>
+          <a:p>
+            <a:pPr marL="800100" lvl="1" indent="-342900">
+              <a:buFont typeface="Arial" panose="020B0604020202020204" pitchFamily="34" charset="0"/>
+              <a:buChar char="•"/>
+            </a:pPr>
+            <a:endParaRPr lang="en-US" sz="2200" dirty="0">
+              <a:solidFill>
+                <a:srgbClr val="002060"/>
+              </a:solidFill>
+            </a:endParaRPr>
+          </a:p>
+          <a:p>
+            <a:pPr marL="800100" lvl="1" indent="-342900">
+              <a:buFont typeface="Arial" panose="020B0604020202020204" pitchFamily="34" charset="0"/>
+              <a:buChar char="•"/>
+            </a:pPr>
+            <a:endParaRPr lang="en-US" sz="2200" dirty="0">
+              <a:solidFill>
+                <a:srgbClr val="002060"/>
+              </a:solidFill>
+            </a:endParaRPr>
+          </a:p>
+          <a:p>
+            <a:pPr marL="800100" lvl="1" indent="-342900">
+              <a:buFont typeface="Arial" panose="020B0604020202020204" pitchFamily="34" charset="0"/>
+              <a:buChar char="•"/>
+            </a:pPr>
+            <a:endParaRPr lang="en-US" sz="2200" dirty="0">
+              <a:solidFill>
+                <a:srgbClr val="002060"/>
+              </a:solidFill>
+            </a:endParaRPr>
+          </a:p>
+          <a:p>
+            <a:endParaRPr lang="en-US" sz="2200" dirty="0">
+              <a:solidFill>
+                <a:srgbClr val="002060"/>
+              </a:solidFill>
+            </a:endParaRPr>
           </a:p>
         </p:txBody>
       </p:sp>
     </p:spTree>
     <p:extLst>
       <p:ext uri="{BB962C8B-B14F-4D97-AF65-F5344CB8AC3E}">
-        <p14:creationId xmlns:p14="http://schemas.microsoft.com/office/powerpoint/2010/main" val="4175034934"/>
+        <p14:creationId xmlns:p14="http://schemas.microsoft.com/office/powerpoint/2010/main" val="3573602773"/>
       </p:ext>
     </p:extLst>
   </p:cSld>
@@ -4057,7 +4282,7 @@
         <p:spPr>
           <a:xfrm>
             <a:off x="0" y="0"/>
-            <a:ext cx="9054790" cy="523220"/>
+            <a:ext cx="8541834" cy="523220"/>
           </a:xfrm>
           <a:prstGeom prst="rect">
             <a:avLst/>
@@ -4075,30 +4300,17 @@
                   <a:srgbClr val="002060"/>
                 </a:solidFill>
               </a:rPr>
-              <a:t>Lab #1 Highlights: Typical procedure for running a </a:t>
-            </a:r>
-            <a:r>
-              <a:rPr lang="en-US" sz="2800" dirty="0" err="1">
-                <a:solidFill>
-                  <a:srgbClr val="002060"/>
-                </a:solidFill>
-              </a:rPr>
-              <a:t>syscall</a:t>
-            </a:r>
-            <a:endParaRPr lang="en-US" sz="2800" dirty="0">
-              <a:solidFill>
-                <a:srgbClr val="002060"/>
-              </a:solidFill>
-            </a:endParaRPr>
+              <a:t>Lab #2: Higher/Lower Game: General organization + tips</a:t>
+            </a:r>
           </a:p>
         </p:txBody>
       </p:sp>
       <p:pic>
         <p:nvPicPr>
-          <p:cNvPr id="3" name="Picture 2" descr="cs0447_2184_lab1.md - Mozilla Firefox">
+          <p:cNvPr id="2" name="Picture 1">
             <a:extLst>
               <a:ext uri="{FF2B5EF4-FFF2-40B4-BE49-F238E27FC236}">
-                <a16:creationId xmlns:a16="http://schemas.microsoft.com/office/drawing/2014/main" id="{1071509B-8ED7-42F0-8E81-A9A86D200715}"/>
+                <a16:creationId xmlns:a16="http://schemas.microsoft.com/office/drawing/2014/main" id="{4CF7D8DA-01BD-44AD-ADAD-DFD366447601}"/>
               </a:ext>
             </a:extLst>
           </p:cNvPr>
@@ -4108,20 +4320,14 @@
           <p:nvPr/>
         </p:nvPicPr>
         <p:blipFill rotWithShape="1">
-          <a:blip r:embed="rId2">
-            <a:extLst>
-              <a:ext uri="{28A0092B-C50C-407E-A947-70E740481C1C}">
-                <a14:useLocalDpi xmlns:a14="http://schemas.microsoft.com/office/drawing/2010/main" val="0"/>
-              </a:ext>
-            </a:extLst>
-          </a:blip>
-          <a:srcRect l="17804" t="17492" r="18172" b="64510"/>
+          <a:blip r:embed="rId2"/>
+          <a:srcRect b="47651"/>
           <a:stretch/>
         </p:blipFill>
         <p:spPr>
           <a:xfrm>
-            <a:off x="0" y="635620"/>
-            <a:ext cx="8686800" cy="1323711"/>
+            <a:off x="182880" y="1235442"/>
+            <a:ext cx="4389120" cy="2511367"/>
           </a:xfrm>
           <a:prstGeom prst="rect">
             <a:avLst/>
@@ -4130,10 +4336,10 @@
       </p:pic>
       <p:sp>
         <p:nvSpPr>
-          <p:cNvPr id="7" name="TextBox 6">
+          <p:cNvPr id="4" name="TextBox 3">
             <a:extLst>
               <a:ext uri="{FF2B5EF4-FFF2-40B4-BE49-F238E27FC236}">
-                <a16:creationId xmlns:a16="http://schemas.microsoft.com/office/drawing/2014/main" id="{B97D3A8D-1BC0-4A13-B673-FBB9F191EA05}"/>
+                <a16:creationId xmlns:a16="http://schemas.microsoft.com/office/drawing/2014/main" id="{3C4649C9-5CF8-4A48-A40D-4D248FE16D2C}"/>
               </a:ext>
             </a:extLst>
           </p:cNvPr>
@@ -4142,8 +4348,8 @@
         </p:nvSpPr>
         <p:spPr>
           <a:xfrm>
-            <a:off x="379141" y="2413337"/>
-            <a:ext cx="7621064" cy="3170099"/>
+            <a:off x="4928839" y="838200"/>
+            <a:ext cx="3780263" cy="4862870"/>
           </a:xfrm>
           <a:prstGeom prst="rect">
             <a:avLst/>
@@ -4156,96 +4362,69 @@
           </a:bodyPr>
           <a:lstStyle/>
           <a:p>
-            <a:pPr marL="457200" indent="-457200">
-              <a:buFont typeface="+mj-lt"/>
-              <a:buAutoNum type="arabicPeriod" startAt="3"/>
-            </a:pPr>
-            <a:r>
-              <a:rPr lang="en-US" sz="2000" dirty="0"/>
-              <a:t>You communicate the required values to the system service by placing them in registers:</a:t>
-            </a:r>
-          </a:p>
-          <a:p>
-            <a:pPr marL="914400" lvl="1" indent="-457200">
+            <a:r>
+              <a:rPr lang="en-US" sz="2200" dirty="0"/>
+              <a:t>The user will need to be presented a game that runs up to three times.</a:t>
+            </a:r>
+          </a:p>
+          <a:p>
+            <a:pPr marL="342900" indent="-342900">
               <a:buFont typeface="Arial" panose="020B0604020202020204" pitchFamily="34" charset="0"/>
               <a:buChar char="•"/>
             </a:pPr>
             <a:r>
-              <a:rPr lang="en-US" sz="2000" dirty="0"/>
-              <a:t>The </a:t>
-            </a:r>
-            <a:r>
-              <a:rPr lang="en-US" sz="2000" dirty="0" err="1"/>
-              <a:t>syscall</a:t>
-            </a:r>
-            <a:r>
-              <a:rPr lang="en-US" sz="2000" dirty="0"/>
-              <a:t> service code is placed in v0</a:t>
-            </a:r>
-          </a:p>
-          <a:p>
-            <a:pPr marL="914400" lvl="1" indent="-457200">
+              <a:rPr lang="en-US" sz="2000" dirty="0">
+                <a:solidFill>
+                  <a:srgbClr val="002060"/>
+                </a:solidFill>
+              </a:rPr>
+              <a:t>You might consider using the following: </a:t>
+            </a:r>
+          </a:p>
+          <a:p>
+            <a:pPr marL="800100" lvl="1" indent="-342900">
               <a:buFont typeface="Arial" panose="020B0604020202020204" pitchFamily="34" charset="0"/>
               <a:buChar char="•"/>
             </a:pPr>
             <a:r>
-              <a:rPr lang="en-US" sz="2000" dirty="0"/>
-              <a:t>If there is just one argument, it is usually placed in the a0 register (but be sure to confirm with the </a:t>
-            </a:r>
-            <a:r>
-              <a:rPr lang="en-US" sz="2000" dirty="0" err="1"/>
-              <a:t>syscall</a:t>
-            </a:r>
-            <a:r>
-              <a:rPr lang="en-US" sz="2000" dirty="0"/>
-              <a:t> table).</a:t>
-            </a:r>
-          </a:p>
-          <a:p>
-            <a:pPr lvl="1"/>
-            <a:endParaRPr lang="en-US" sz="2000" dirty="0"/>
-          </a:p>
-          <a:p>
-            <a:pPr marL="457200" indent="-457200">
-              <a:buFont typeface="+mj-lt"/>
-              <a:buAutoNum type="arabicPeriod" startAt="4"/>
+              <a:rPr lang="en-US" sz="2000" dirty="0">
+                <a:solidFill>
+                  <a:srgbClr val="002060"/>
+                </a:solidFill>
+              </a:rPr>
+              <a:t>One register to maintain a count of attempts</a:t>
+            </a:r>
+          </a:p>
+          <a:p>
+            <a:pPr marL="800100" lvl="1" indent="-342900">
+              <a:buFont typeface="Arial" panose="020B0604020202020204" pitchFamily="34" charset="0"/>
+              <a:buChar char="•"/>
             </a:pPr>
             <a:r>
-              <a:rPr lang="en-US" sz="2000" dirty="0"/>
-              <a:t>Once the values are in the registers, you can invoke a “</a:t>
-            </a:r>
-            <a:r>
-              <a:rPr lang="en-US" sz="2000" dirty="0" err="1"/>
-              <a:t>syscall</a:t>
-            </a:r>
-            <a:r>
-              <a:rPr lang="en-US" sz="2000" dirty="0"/>
-              <a:t>.”</a:t>
-            </a:r>
-          </a:p>
-          <a:p>
-            <a:pPr marL="457200" indent="-457200">
-              <a:buFont typeface="+mj-lt"/>
-              <a:buAutoNum type="arabicPeriod" startAt="4"/>
+              <a:rPr lang="en-US" sz="2000" dirty="0">
+                <a:solidFill>
+                  <a:srgbClr val="002060"/>
+                </a:solidFill>
+              </a:rPr>
+              <a:t>Jumps and/or branches, and comparison instructions to determine whether the maximum # of attempts has been reached.</a:t>
+            </a:r>
+          </a:p>
+          <a:p>
+            <a:pPr marL="800100" lvl="1" indent="-342900">
+              <a:buFont typeface="Arial" panose="020B0604020202020204" pitchFamily="34" charset="0"/>
+              <a:buChar char="•"/>
             </a:pPr>
-            <a:endParaRPr lang="en-US" sz="2000" dirty="0"/>
-          </a:p>
-          <a:p>
-            <a:pPr marL="457200" indent="-457200">
-              <a:buFont typeface="+mj-lt"/>
-              <a:buAutoNum type="arabicPeriod" startAt="4"/>
-            </a:pPr>
-            <a:r>
-              <a:rPr lang="en-US" sz="2000" dirty="0"/>
-              <a:t>The lab instructions will walk you through a specific example, in which you print the integer “1234.”</a:t>
-            </a:r>
+            <a:endParaRPr lang="en-US" sz="2200" dirty="0"/>
+          </a:p>
+          <a:p>
+            <a:endParaRPr lang="en-US" sz="2200" dirty="0"/>
           </a:p>
         </p:txBody>
       </p:sp>
     </p:spTree>
     <p:extLst>
       <p:ext uri="{BB962C8B-B14F-4D97-AF65-F5344CB8AC3E}">
-        <p14:creationId xmlns:p14="http://schemas.microsoft.com/office/powerpoint/2010/main" val="1470613370"/>
+        <p14:creationId xmlns:p14="http://schemas.microsoft.com/office/powerpoint/2010/main" val="3366368118"/>
       </p:ext>
     </p:extLst>
   </p:cSld>
@@ -4281,7 +4460,7 @@
         <p:spPr>
           <a:xfrm>
             <a:off x="0" y="0"/>
-            <a:ext cx="9054790" cy="523220"/>
+            <a:ext cx="8541834" cy="523220"/>
           </a:xfrm>
           <a:prstGeom prst="rect">
             <a:avLst/>
@@ -4299,17 +4478,46 @@
                   <a:srgbClr val="002060"/>
                 </a:solidFill>
               </a:rPr>
-              <a:t>Lab #1 Highlights: Writing a function</a:t>
-            </a:r>
-          </a:p>
-        </p:txBody>
-      </p:sp>
-      <p:sp>
-        <p:nvSpPr>
-          <p:cNvPr id="2" name="TextBox 1">
+              <a:t>Lab #2: Higher/Lower Game: General organization + tips</a:t>
+            </a:r>
+          </a:p>
+        </p:txBody>
+      </p:sp>
+      <p:pic>
+        <p:nvPicPr>
+          <p:cNvPr id="2" name="Picture 1">
             <a:extLst>
               <a:ext uri="{FF2B5EF4-FFF2-40B4-BE49-F238E27FC236}">
-                <a16:creationId xmlns:a16="http://schemas.microsoft.com/office/drawing/2014/main" id="{05585F7D-BE50-435B-89CE-03BC2EB21DAB}"/>
+                <a16:creationId xmlns:a16="http://schemas.microsoft.com/office/drawing/2014/main" id="{4CF7D8DA-01BD-44AD-ADAD-DFD366447601}"/>
+              </a:ext>
+            </a:extLst>
+          </p:cNvPr>
+          <p:cNvPicPr>
+            <a:picLocks noChangeAspect="1"/>
+          </p:cNvPicPr>
+          <p:nvPr/>
+        </p:nvPicPr>
+        <p:blipFill rotWithShape="1">
+          <a:blip r:embed="rId2"/>
+          <a:srcRect b="47651"/>
+          <a:stretch/>
+        </p:blipFill>
+        <p:spPr>
+          <a:xfrm>
+            <a:off x="182880" y="1235442"/>
+            <a:ext cx="4389120" cy="2511367"/>
+          </a:xfrm>
+          <a:prstGeom prst="rect">
+            <a:avLst/>
+          </a:prstGeom>
+        </p:spPr>
+      </p:pic>
+      <p:sp>
+        <p:nvSpPr>
+          <p:cNvPr id="4" name="TextBox 3">
+            <a:extLst>
+              <a:ext uri="{FF2B5EF4-FFF2-40B4-BE49-F238E27FC236}">
+                <a16:creationId xmlns:a16="http://schemas.microsoft.com/office/drawing/2014/main" id="{3C4649C9-5CF8-4A48-A40D-4D248FE16D2C}"/>
               </a:ext>
             </a:extLst>
           </p:cNvPr>
@@ -4318,8 +4526,8 @@
         </p:nvSpPr>
         <p:spPr>
           <a:xfrm>
-            <a:off x="468351" y="747132"/>
-            <a:ext cx="8006576" cy="769441"/>
+            <a:off x="4928839" y="838200"/>
+            <a:ext cx="3780263" cy="2677656"/>
           </a:xfrm>
           <a:prstGeom prst="rect">
             <a:avLst/>
@@ -4334,222 +4542,72 @@
           <a:p>
             <a:r>
               <a:rPr lang="en-US" sz="2200" dirty="0"/>
-              <a:t>We’re going to create the MIPS analogue of a function, so that the function can handle our “print integer” </a:t>
-            </a:r>
-            <a:r>
-              <a:rPr lang="en-US" sz="2200" dirty="0" err="1"/>
-              <a:t>syscall</a:t>
-            </a:r>
-            <a:r>
-              <a:rPr lang="en-US" sz="2200" dirty="0"/>
-              <a:t> for us.</a:t>
-            </a:r>
-          </a:p>
-        </p:txBody>
-      </p:sp>
-      <p:sp>
-        <p:nvSpPr>
-          <p:cNvPr id="6" name="TextBox 5">
-            <a:extLst>
-              <a:ext uri="{FF2B5EF4-FFF2-40B4-BE49-F238E27FC236}">
-                <a16:creationId xmlns:a16="http://schemas.microsoft.com/office/drawing/2014/main" id="{E97111A3-34C1-4A49-96A8-8E688A8D1288}"/>
-              </a:ext>
-            </a:extLst>
-          </p:cNvPr>
-          <p:cNvSpPr txBox="1"/>
-          <p:nvPr/>
-        </p:nvSpPr>
-        <p:spPr>
-          <a:xfrm>
-            <a:off x="669073" y="1828800"/>
-            <a:ext cx="7805854" cy="2800767"/>
-          </a:xfrm>
-          <a:prstGeom prst="rect">
-            <a:avLst/>
-          </a:prstGeom>
-          <a:noFill/>
-        </p:spPr>
-        <p:txBody>
-          <a:bodyPr wrap="square" rtlCol="0">
-            <a:spAutoFit/>
-          </a:bodyPr>
-          <a:lstStyle/>
-          <a:p>
-            <a:pPr marL="285750" indent="-285750">
+              <a:t>You will need to both display and read information. </a:t>
+            </a:r>
+          </a:p>
+          <a:p>
+            <a:endParaRPr lang="en-US" sz="2200" dirty="0"/>
+          </a:p>
+          <a:p>
+            <a:pPr marL="342900" indent="-342900">
               <a:buFont typeface="Arial" panose="020B0604020202020204" pitchFamily="34" charset="0"/>
               <a:buChar char="•"/>
             </a:pPr>
             <a:r>
-              <a:rPr lang="en-US" sz="2200" dirty="0"/>
-              <a:t>This process will make a lot more sense after functions are discussed in lecture. </a:t>
-            </a:r>
-          </a:p>
-          <a:p>
-            <a:pPr marL="285750" indent="-285750">
+              <a:rPr lang="en-US" sz="2000" dirty="0">
+                <a:solidFill>
+                  <a:srgbClr val="002060"/>
+                </a:solidFill>
+              </a:rPr>
+              <a:t>Consider </a:t>
+            </a:r>
+            <a:r>
+              <a:rPr lang="en-US" sz="2000" dirty="0" err="1">
+                <a:solidFill>
+                  <a:srgbClr val="002060"/>
+                </a:solidFill>
+              </a:rPr>
+              <a:t>syscalls</a:t>
+            </a:r>
+            <a:r>
+              <a:rPr lang="en-US" sz="2000" dirty="0">
+                <a:solidFill>
+                  <a:srgbClr val="002060"/>
+                </a:solidFill>
+              </a:rPr>
+              <a:t> 1, 4, and 5</a:t>
+            </a:r>
+          </a:p>
+          <a:p>
+            <a:endParaRPr lang="en-US" sz="2000" dirty="0">
+              <a:solidFill>
+                <a:srgbClr val="002060"/>
+              </a:solidFill>
+            </a:endParaRPr>
+          </a:p>
+          <a:p>
+            <a:pPr marL="342900" indent="-342900">
               <a:buFont typeface="Arial" panose="020B0604020202020204" pitchFamily="34" charset="0"/>
               <a:buChar char="•"/>
             </a:pPr>
-            <a:endParaRPr lang="en-US" sz="2200" dirty="0"/>
-          </a:p>
-          <a:p>
-            <a:pPr marL="285750" indent="-285750">
-              <a:buFont typeface="Arial" panose="020B0604020202020204" pitchFamily="34" charset="0"/>
-              <a:buChar char="•"/>
-            </a:pPr>
-            <a:r>
-              <a:rPr lang="en-US" sz="2200" dirty="0"/>
-              <a:t>In Java, the analogous function would look something like this:</a:t>
-            </a:r>
-          </a:p>
-          <a:p>
-            <a:pPr marL="285750" indent="-285750">
-              <a:buFont typeface="Arial" panose="020B0604020202020204" pitchFamily="34" charset="0"/>
-              <a:buChar char="•"/>
-            </a:pPr>
-            <a:endParaRPr lang="en-US" sz="2200" dirty="0"/>
-          </a:p>
-          <a:p>
-            <a:r>
-              <a:rPr lang="en-US" sz="2200" dirty="0">
+            <a:r>
+              <a:rPr lang="en-US" sz="2000" dirty="0">
                 <a:solidFill>
                   <a:srgbClr val="002060"/>
                 </a:solidFill>
-                <a:latin typeface="Consolas" panose="020B0609020204030204" pitchFamily="49" charset="0"/>
-                <a:cs typeface="Consolas" panose="020B0609020204030204" pitchFamily="49" charset="0"/>
-              </a:rPr>
-              <a:t>public void </a:t>
-            </a:r>
-            <a:r>
-              <a:rPr lang="en-US" sz="2200" dirty="0" err="1">
-                <a:solidFill>
-                  <a:srgbClr val="002060"/>
-                </a:solidFill>
-                <a:latin typeface="Consolas" panose="020B0609020204030204" pitchFamily="49" charset="0"/>
-                <a:cs typeface="Consolas" panose="020B0609020204030204" pitchFamily="49" charset="0"/>
-              </a:rPr>
-              <a:t>printInt</a:t>
-            </a:r>
-            <a:r>
-              <a:rPr lang="en-US" sz="2200" dirty="0">
-                <a:solidFill>
-                  <a:srgbClr val="002060"/>
-                </a:solidFill>
-                <a:latin typeface="Consolas" panose="020B0609020204030204" pitchFamily="49" charset="0"/>
-                <a:cs typeface="Consolas" panose="020B0609020204030204" pitchFamily="49" charset="0"/>
-              </a:rPr>
-              <a:t> (</a:t>
-            </a:r>
-            <a:r>
-              <a:rPr lang="en-US" sz="2200" dirty="0" err="1">
-                <a:solidFill>
-                  <a:srgbClr val="002060"/>
-                </a:solidFill>
-                <a:latin typeface="Consolas" panose="020B0609020204030204" pitchFamily="49" charset="0"/>
-                <a:cs typeface="Consolas" panose="020B0609020204030204" pitchFamily="49" charset="0"/>
-              </a:rPr>
-              <a:t>int</a:t>
-            </a:r>
-            <a:r>
-              <a:rPr lang="en-US" sz="2200" dirty="0">
-                <a:solidFill>
-                  <a:srgbClr val="002060"/>
-                </a:solidFill>
-                <a:latin typeface="Consolas" panose="020B0609020204030204" pitchFamily="49" charset="0"/>
-                <a:cs typeface="Consolas" panose="020B0609020204030204" pitchFamily="49" charset="0"/>
-              </a:rPr>
-              <a:t> </a:t>
-            </a:r>
-            <a:r>
-              <a:rPr lang="en-US" sz="2200" dirty="0" err="1">
-                <a:solidFill>
-                  <a:srgbClr val="002060"/>
-                </a:solidFill>
-                <a:latin typeface="Consolas" panose="020B0609020204030204" pitchFamily="49" charset="0"/>
-                <a:cs typeface="Consolas" panose="020B0609020204030204" pitchFamily="49" charset="0"/>
-              </a:rPr>
-              <a:t>i</a:t>
-            </a:r>
-            <a:r>
-              <a:rPr lang="en-US" sz="2200" dirty="0">
-                <a:solidFill>
-                  <a:srgbClr val="002060"/>
-                </a:solidFill>
-                <a:latin typeface="Consolas" panose="020B0609020204030204" pitchFamily="49" charset="0"/>
-                <a:cs typeface="Consolas" panose="020B0609020204030204" pitchFamily="49" charset="0"/>
-              </a:rPr>
-              <a:t>) {</a:t>
-            </a:r>
-          </a:p>
-          <a:p>
-            <a:r>
-              <a:rPr lang="en-US" sz="2200" dirty="0">
-                <a:solidFill>
-                  <a:srgbClr val="002060"/>
-                </a:solidFill>
-                <a:latin typeface="Consolas" panose="020B0609020204030204" pitchFamily="49" charset="0"/>
-                <a:cs typeface="Consolas" panose="020B0609020204030204" pitchFamily="49" charset="0"/>
-              </a:rPr>
-              <a:t>	</a:t>
-            </a:r>
-            <a:r>
-              <a:rPr lang="en-US" sz="2200" dirty="0" err="1">
-                <a:solidFill>
-                  <a:srgbClr val="002060"/>
-                </a:solidFill>
-                <a:latin typeface="Consolas" panose="020B0609020204030204" pitchFamily="49" charset="0"/>
-                <a:cs typeface="Consolas" panose="020B0609020204030204" pitchFamily="49" charset="0"/>
-              </a:rPr>
-              <a:t>System.out.print</a:t>
-            </a:r>
-            <a:r>
-              <a:rPr lang="en-US" sz="2200" dirty="0">
-                <a:solidFill>
-                  <a:srgbClr val="002060"/>
-                </a:solidFill>
-                <a:latin typeface="Consolas" panose="020B0609020204030204" pitchFamily="49" charset="0"/>
-                <a:cs typeface="Consolas" panose="020B0609020204030204" pitchFamily="49" charset="0"/>
-              </a:rPr>
-              <a:t>(</a:t>
-            </a:r>
-            <a:r>
-              <a:rPr lang="en-US" sz="2200" dirty="0" err="1">
-                <a:solidFill>
-                  <a:srgbClr val="002060"/>
-                </a:solidFill>
-                <a:latin typeface="Consolas" panose="020B0609020204030204" pitchFamily="49" charset="0"/>
-                <a:cs typeface="Consolas" panose="020B0609020204030204" pitchFamily="49" charset="0"/>
-              </a:rPr>
-              <a:t>i</a:t>
-            </a:r>
-            <a:r>
-              <a:rPr lang="en-US" sz="2200" dirty="0">
-                <a:solidFill>
-                  <a:srgbClr val="002060"/>
-                </a:solidFill>
-                <a:latin typeface="Consolas" panose="020B0609020204030204" pitchFamily="49" charset="0"/>
-                <a:cs typeface="Consolas" panose="020B0609020204030204" pitchFamily="49" charset="0"/>
-              </a:rPr>
-              <a:t>);</a:t>
-            </a:r>
-          </a:p>
-          <a:p>
-            <a:r>
-              <a:rPr lang="en-US" sz="2200" dirty="0">
-                <a:solidFill>
-                  <a:srgbClr val="002060"/>
-                </a:solidFill>
-                <a:latin typeface="Consolas" panose="020B0609020204030204" pitchFamily="49" charset="0"/>
-                <a:cs typeface="Consolas" panose="020B0609020204030204" pitchFamily="49" charset="0"/>
-              </a:rPr>
-              <a:t>}</a:t>
-            </a:r>
+              </a:rPr>
+              <a:t>Note that 5 (read integer) will put the input integer into $v0.</a:t>
+            </a:r>
+          </a:p>
+          <a:p>
+            <a:endParaRPr lang="en-US" sz="2200" dirty="0"/>
           </a:p>
         </p:txBody>
       </p:sp>
     </p:spTree>
     <p:extLst>
       <p:ext uri="{BB962C8B-B14F-4D97-AF65-F5344CB8AC3E}">
-        <p14:creationId xmlns:p14="http://schemas.microsoft.com/office/powerpoint/2010/main" val="4194006326"/>
+        <p14:creationId xmlns:p14="http://schemas.microsoft.com/office/powerpoint/2010/main" val="1455180863"/>
       </p:ext>
     </p:extLst>
   </p:cSld>
@@ -4585,7 +4643,7 @@
         <p:spPr>
           <a:xfrm>
             <a:off x="0" y="0"/>
-            <a:ext cx="9054790" cy="523220"/>
+            <a:ext cx="8541834" cy="523220"/>
           </a:xfrm>
           <a:prstGeom prst="rect">
             <a:avLst/>
@@ -4603,17 +4661,46 @@
                   <a:srgbClr val="002060"/>
                 </a:solidFill>
               </a:rPr>
-              <a:t>Lab #1 Highlights: Writing a function</a:t>
-            </a:r>
-          </a:p>
-        </p:txBody>
-      </p:sp>
-      <p:sp>
-        <p:nvSpPr>
-          <p:cNvPr id="6" name="TextBox 5">
+              <a:t>Lab #2: Higher/Lower Game: General organization + tips</a:t>
+            </a:r>
+          </a:p>
+        </p:txBody>
+      </p:sp>
+      <p:pic>
+        <p:nvPicPr>
+          <p:cNvPr id="2" name="Picture 1">
             <a:extLst>
               <a:ext uri="{FF2B5EF4-FFF2-40B4-BE49-F238E27FC236}">
-                <a16:creationId xmlns:a16="http://schemas.microsoft.com/office/drawing/2014/main" id="{E97111A3-34C1-4A49-96A8-8E688A8D1288}"/>
+                <a16:creationId xmlns:a16="http://schemas.microsoft.com/office/drawing/2014/main" id="{4CF7D8DA-01BD-44AD-ADAD-DFD366447601}"/>
+              </a:ext>
+            </a:extLst>
+          </p:cNvPr>
+          <p:cNvPicPr>
+            <a:picLocks noChangeAspect="1"/>
+          </p:cNvPicPr>
+          <p:nvPr/>
+        </p:nvPicPr>
+        <p:blipFill rotWithShape="1">
+          <a:blip r:embed="rId2"/>
+          <a:srcRect b="47651"/>
+          <a:stretch/>
+        </p:blipFill>
+        <p:spPr>
+          <a:xfrm>
+            <a:off x="182880" y="1235442"/>
+            <a:ext cx="4389120" cy="2511367"/>
+          </a:xfrm>
+          <a:prstGeom prst="rect">
+            <a:avLst/>
+          </a:prstGeom>
+        </p:spPr>
+      </p:pic>
+      <p:sp>
+        <p:nvSpPr>
+          <p:cNvPr id="4" name="TextBox 3">
+            <a:extLst>
+              <a:ext uri="{FF2B5EF4-FFF2-40B4-BE49-F238E27FC236}">
+                <a16:creationId xmlns:a16="http://schemas.microsoft.com/office/drawing/2014/main" id="{3C4649C9-5CF8-4A48-A40D-4D248FE16D2C}"/>
               </a:ext>
             </a:extLst>
           </p:cNvPr>
@@ -4622,8 +4709,8 @@
         </p:nvSpPr>
         <p:spPr>
           <a:xfrm>
-            <a:off x="457199" y="838200"/>
-            <a:ext cx="7805854" cy="1107996"/>
+            <a:off x="4962293" y="610136"/>
+            <a:ext cx="3780263" cy="6247864"/>
           </a:xfrm>
           <a:prstGeom prst="rect">
             <a:avLst/>
@@ -4637,218 +4724,36 @@
           <a:lstStyle/>
           <a:p>
             <a:r>
+              <a:rPr lang="en-US" sz="2200" dirty="0"/>
+              <a:t>You will need to display messages that depend on how the user’s number compares to the actual number. </a:t>
+            </a:r>
+          </a:p>
+          <a:p>
+            <a:pPr marL="342900" indent="-342900">
+              <a:buFont typeface="Arial" panose="020B0604020202020204" pitchFamily="34" charset="0"/>
+              <a:buChar char="•"/>
+            </a:pPr>
+            <a:r>
               <a:rPr lang="en-US" sz="2200" dirty="0">
                 <a:solidFill>
                   <a:srgbClr val="002060"/>
                 </a:solidFill>
-                <a:latin typeface="Consolas" panose="020B0609020204030204" pitchFamily="49" charset="0"/>
-                <a:cs typeface="Consolas" panose="020B0609020204030204" pitchFamily="49" charset="0"/>
-              </a:rPr>
-              <a:t>public void </a:t>
-            </a:r>
-            <a:r>
-              <a:rPr lang="en-US" sz="2200" dirty="0" err="1">
-                <a:solidFill>
-                  <a:srgbClr val="002060"/>
-                </a:solidFill>
-                <a:latin typeface="Consolas" panose="020B0609020204030204" pitchFamily="49" charset="0"/>
-                <a:cs typeface="Consolas" panose="020B0609020204030204" pitchFamily="49" charset="0"/>
-              </a:rPr>
-              <a:t>printInt</a:t>
-            </a:r>
+              </a:rPr>
+              <a:t>You might consider several labels, comparisons, branches, and jumps for this.</a:t>
+            </a:r>
+          </a:p>
+          <a:p>
+            <a:pPr marL="342900" indent="-342900">
+              <a:buFont typeface="Arial" panose="020B0604020202020204" pitchFamily="34" charset="0"/>
+              <a:buChar char="•"/>
+            </a:pPr>
             <a:r>
               <a:rPr lang="en-US" sz="2200" dirty="0">
                 <a:solidFill>
                   <a:srgbClr val="002060"/>
                 </a:solidFill>
-                <a:latin typeface="Consolas" panose="020B0609020204030204" pitchFamily="49" charset="0"/>
-                <a:cs typeface="Consolas" panose="020B0609020204030204" pitchFamily="49" charset="0"/>
-              </a:rPr>
-              <a:t> (</a:t>
-            </a:r>
-            <a:r>
-              <a:rPr lang="en-US" sz="2200" dirty="0" err="1">
-                <a:solidFill>
-                  <a:srgbClr val="002060"/>
-                </a:solidFill>
-                <a:latin typeface="Consolas" panose="020B0609020204030204" pitchFamily="49" charset="0"/>
-                <a:cs typeface="Consolas" panose="020B0609020204030204" pitchFamily="49" charset="0"/>
-              </a:rPr>
-              <a:t>int</a:t>
-            </a:r>
-            <a:r>
-              <a:rPr lang="en-US" sz="2200" dirty="0">
-                <a:solidFill>
-                  <a:srgbClr val="002060"/>
-                </a:solidFill>
-                <a:latin typeface="Consolas" panose="020B0609020204030204" pitchFamily="49" charset="0"/>
-                <a:cs typeface="Consolas" panose="020B0609020204030204" pitchFamily="49" charset="0"/>
-              </a:rPr>
-              <a:t> </a:t>
-            </a:r>
-            <a:r>
-              <a:rPr lang="en-US" sz="2200" dirty="0" err="1">
-                <a:solidFill>
-                  <a:srgbClr val="002060"/>
-                </a:solidFill>
-                <a:latin typeface="Consolas" panose="020B0609020204030204" pitchFamily="49" charset="0"/>
-                <a:cs typeface="Consolas" panose="020B0609020204030204" pitchFamily="49" charset="0"/>
-              </a:rPr>
-              <a:t>i</a:t>
-            </a:r>
-            <a:r>
-              <a:rPr lang="en-US" sz="2200" dirty="0">
-                <a:solidFill>
-                  <a:srgbClr val="002060"/>
-                </a:solidFill>
-                <a:latin typeface="Consolas" panose="020B0609020204030204" pitchFamily="49" charset="0"/>
-                <a:cs typeface="Consolas" panose="020B0609020204030204" pitchFamily="49" charset="0"/>
-              </a:rPr>
-              <a:t>) {</a:t>
-            </a:r>
-          </a:p>
-          <a:p>
-            <a:r>
-              <a:rPr lang="en-US" sz="2200" dirty="0">
-                <a:solidFill>
-                  <a:srgbClr val="002060"/>
-                </a:solidFill>
-                <a:latin typeface="Consolas" panose="020B0609020204030204" pitchFamily="49" charset="0"/>
-                <a:cs typeface="Consolas" panose="020B0609020204030204" pitchFamily="49" charset="0"/>
-              </a:rPr>
-              <a:t>	</a:t>
-            </a:r>
-            <a:r>
-              <a:rPr lang="en-US" sz="2200" dirty="0" err="1">
-                <a:solidFill>
-                  <a:srgbClr val="002060"/>
-                </a:solidFill>
-                <a:latin typeface="Consolas" panose="020B0609020204030204" pitchFamily="49" charset="0"/>
-                <a:cs typeface="Consolas" panose="020B0609020204030204" pitchFamily="49" charset="0"/>
-              </a:rPr>
-              <a:t>System.out.print</a:t>
-            </a:r>
-            <a:r>
-              <a:rPr lang="en-US" sz="2200" dirty="0">
-                <a:solidFill>
-                  <a:srgbClr val="002060"/>
-                </a:solidFill>
-                <a:latin typeface="Consolas" panose="020B0609020204030204" pitchFamily="49" charset="0"/>
-                <a:cs typeface="Consolas" panose="020B0609020204030204" pitchFamily="49" charset="0"/>
-              </a:rPr>
-              <a:t>(</a:t>
-            </a:r>
-            <a:r>
-              <a:rPr lang="en-US" sz="2200" dirty="0" err="1">
-                <a:solidFill>
-                  <a:srgbClr val="002060"/>
-                </a:solidFill>
-                <a:latin typeface="Consolas" panose="020B0609020204030204" pitchFamily="49" charset="0"/>
-                <a:cs typeface="Consolas" panose="020B0609020204030204" pitchFamily="49" charset="0"/>
-              </a:rPr>
-              <a:t>i</a:t>
-            </a:r>
-            <a:r>
-              <a:rPr lang="en-US" sz="2200" dirty="0">
-                <a:solidFill>
-                  <a:srgbClr val="002060"/>
-                </a:solidFill>
-                <a:latin typeface="Consolas" panose="020B0609020204030204" pitchFamily="49" charset="0"/>
-                <a:cs typeface="Consolas" panose="020B0609020204030204" pitchFamily="49" charset="0"/>
-              </a:rPr>
-              <a:t>);</a:t>
-            </a:r>
-          </a:p>
-          <a:p>
-            <a:r>
-              <a:rPr lang="en-US" sz="2200" dirty="0">
-                <a:solidFill>
-                  <a:srgbClr val="002060"/>
-                </a:solidFill>
-                <a:latin typeface="Consolas" panose="020B0609020204030204" pitchFamily="49" charset="0"/>
-                <a:cs typeface="Consolas" panose="020B0609020204030204" pitchFamily="49" charset="0"/>
-              </a:rPr>
-              <a:t>}</a:t>
-            </a:r>
-          </a:p>
-        </p:txBody>
-      </p:sp>
-      <p:sp>
-        <p:nvSpPr>
-          <p:cNvPr id="3" name="TextBox 2">
-            <a:extLst>
-              <a:ext uri="{FF2B5EF4-FFF2-40B4-BE49-F238E27FC236}">
-                <a16:creationId xmlns:a16="http://schemas.microsoft.com/office/drawing/2014/main" id="{A0017F5F-5680-4510-895A-4D3DDB55E9EA}"/>
-              </a:ext>
-            </a:extLst>
-          </p:cNvPr>
-          <p:cNvSpPr txBox="1"/>
-          <p:nvPr/>
-        </p:nvSpPr>
-        <p:spPr>
-          <a:xfrm>
-            <a:off x="702526" y="2261176"/>
-            <a:ext cx="7649737" cy="3970318"/>
-          </a:xfrm>
-          <a:prstGeom prst="rect">
-            <a:avLst/>
-          </a:prstGeom>
-          <a:noFill/>
-        </p:spPr>
-        <p:txBody>
-          <a:bodyPr wrap="square" rtlCol="0">
-            <a:spAutoFit/>
-          </a:bodyPr>
-          <a:lstStyle/>
-          <a:p>
-            <a:r>
-              <a:rPr lang="en-US" sz="2400" dirty="0"/>
-              <a:t>The lab will explain how to write the equivalent in MIPS.</a:t>
-            </a:r>
-          </a:p>
-          <a:p>
-            <a:endParaRPr lang="en-US" sz="2400" dirty="0"/>
-          </a:p>
-          <a:p>
-            <a:r>
-              <a:rPr lang="en-US" sz="2400" dirty="0"/>
-              <a:t>A few comments: </a:t>
-            </a:r>
-          </a:p>
-          <a:p>
-            <a:pPr marL="342900" indent="-342900">
-              <a:buFont typeface="Arial" panose="020B0604020202020204" pitchFamily="34" charset="0"/>
-              <a:buChar char="•"/>
-            </a:pPr>
-            <a:r>
-              <a:rPr lang="en-US" sz="2400" dirty="0"/>
-              <a:t>Your function will expect to find the integer to print in the register a0.</a:t>
-            </a:r>
-          </a:p>
-          <a:p>
-            <a:pPr marL="342900" indent="-342900">
-              <a:buFont typeface="Arial" panose="020B0604020202020204" pitchFamily="34" charset="0"/>
-              <a:buChar char="•"/>
-            </a:pPr>
-            <a:r>
-              <a:rPr lang="en-US" sz="2400" dirty="0"/>
-              <a:t>You will end your function with “</a:t>
-            </a:r>
-            <a:r>
-              <a:rPr lang="en-US" sz="2400" dirty="0" err="1"/>
-              <a:t>jr</a:t>
-            </a:r>
-            <a:r>
-              <a:rPr lang="en-US" sz="2400" dirty="0"/>
-              <a:t> </a:t>
-            </a:r>
-            <a:r>
-              <a:rPr lang="en-US" sz="2400" dirty="0" err="1"/>
-              <a:t>ra</a:t>
-            </a:r>
-            <a:r>
-              <a:rPr lang="en-US" sz="2400" dirty="0"/>
-              <a:t>”.</a:t>
+              </a:rPr>
+              <a:t>For testing/debugging: </a:t>
             </a:r>
           </a:p>
           <a:p>
@@ -4857,72 +4762,23 @@
               <a:buChar char="•"/>
             </a:pPr>
             <a:r>
-              <a:rPr lang="en-US" sz="2400" dirty="0" err="1">
-                <a:solidFill>
-                  <a:srgbClr val="002060"/>
-                </a:solidFill>
-              </a:rPr>
-              <a:t>jr</a:t>
-            </a:r>
-            <a:r>
-              <a:rPr lang="en-US" sz="2400" dirty="0">
-                <a:solidFill>
-                  <a:srgbClr val="002060"/>
-                </a:solidFill>
-              </a:rPr>
-              <a:t> = jump register (see Help/Basic Instructions)</a:t>
-            </a:r>
-          </a:p>
-          <a:p>
-            <a:pPr marL="800100" lvl="1" indent="-342900">
-              <a:buFont typeface="Arial" panose="020B0604020202020204" pitchFamily="34" charset="0"/>
-              <a:buChar char="•"/>
-            </a:pPr>
-            <a:r>
-              <a:rPr lang="en-US" sz="2400" dirty="0">
-                <a:solidFill>
-                  <a:srgbClr val="002060"/>
-                </a:solidFill>
-              </a:rPr>
-              <a:t>“</a:t>
-            </a:r>
-            <a:r>
-              <a:rPr lang="en-US" sz="2400" dirty="0" err="1">
-                <a:solidFill>
-                  <a:srgbClr val="002060"/>
-                </a:solidFill>
-              </a:rPr>
-              <a:t>ra</a:t>
-            </a:r>
-            <a:r>
-              <a:rPr lang="en-US" sz="2400" dirty="0">
-                <a:solidFill>
-                  <a:srgbClr val="002060"/>
-                </a:solidFill>
-              </a:rPr>
-              <a:t>” is a register that holds the return address</a:t>
-            </a:r>
-          </a:p>
-          <a:p>
-            <a:pPr marL="1257300" lvl="2" indent="-342900">
-              <a:buFont typeface="Arial" panose="020B0604020202020204" pitchFamily="34" charset="0"/>
-              <a:buChar char="•"/>
-            </a:pPr>
-            <a:r>
               <a:rPr lang="en-US" sz="2000" dirty="0">
                 <a:solidFill>
                   <a:srgbClr val="002060"/>
                 </a:solidFill>
               </a:rPr>
-              <a:t>In other words, it tells the program to return to the spot where it left off in the main method, when the function was originally called</a:t>
-            </a:r>
+              <a:t>For unknown reasons, the random number you generated may not be visible in the register at the time you input the integer, if you execute at full speed.  You may be able to see it if you step through the program.</a:t>
+            </a:r>
+          </a:p>
+          <a:p>
+            <a:endParaRPr lang="en-US" sz="2200" dirty="0"/>
           </a:p>
         </p:txBody>
       </p:sp>
     </p:spTree>
     <p:extLst>
       <p:ext uri="{BB962C8B-B14F-4D97-AF65-F5344CB8AC3E}">
-        <p14:creationId xmlns:p14="http://schemas.microsoft.com/office/powerpoint/2010/main" val="1417200933"/>
+        <p14:creationId xmlns:p14="http://schemas.microsoft.com/office/powerpoint/2010/main" val="3246432985"/>
       </p:ext>
     </p:extLst>
   </p:cSld>
@@ -4958,7 +4814,7 @@
         <p:spPr>
           <a:xfrm>
             <a:off x="0" y="0"/>
-            <a:ext cx="9054790" cy="523220"/>
+            <a:ext cx="8541834" cy="523220"/>
           </a:xfrm>
           <a:prstGeom prst="rect">
             <a:avLst/>
@@ -4976,17 +4832,46 @@
                   <a:srgbClr val="002060"/>
                 </a:solidFill>
               </a:rPr>
-              <a:t>Lab #1 Highlights: Calling a function</a:t>
-            </a:r>
-          </a:p>
-        </p:txBody>
-      </p:sp>
-      <p:sp>
-        <p:nvSpPr>
-          <p:cNvPr id="7" name="TextBox 6">
+              <a:t>Lab #2: Higher/Lower Game: General organization + tips</a:t>
+            </a:r>
+          </a:p>
+        </p:txBody>
+      </p:sp>
+      <p:pic>
+        <p:nvPicPr>
+          <p:cNvPr id="2" name="Picture 1">
             <a:extLst>
               <a:ext uri="{FF2B5EF4-FFF2-40B4-BE49-F238E27FC236}">
-                <a16:creationId xmlns:a16="http://schemas.microsoft.com/office/drawing/2014/main" id="{DD54A3C6-B421-45D7-8AF2-D163AAAF6ECF}"/>
+                <a16:creationId xmlns:a16="http://schemas.microsoft.com/office/drawing/2014/main" id="{4CF7D8DA-01BD-44AD-ADAD-DFD366447601}"/>
+              </a:ext>
+            </a:extLst>
+          </p:cNvPr>
+          <p:cNvPicPr>
+            <a:picLocks noChangeAspect="1"/>
+          </p:cNvPicPr>
+          <p:nvPr/>
+        </p:nvPicPr>
+        <p:blipFill rotWithShape="1">
+          <a:blip r:embed="rId2"/>
+          <a:srcRect b="47651"/>
+          <a:stretch/>
+        </p:blipFill>
+        <p:spPr>
+          <a:xfrm>
+            <a:off x="182880" y="1235442"/>
+            <a:ext cx="4389120" cy="2511367"/>
+          </a:xfrm>
+          <a:prstGeom prst="rect">
+            <a:avLst/>
+          </a:prstGeom>
+        </p:spPr>
+      </p:pic>
+      <p:sp>
+        <p:nvSpPr>
+          <p:cNvPr id="4" name="TextBox 3">
+            <a:extLst>
+              <a:ext uri="{FF2B5EF4-FFF2-40B4-BE49-F238E27FC236}">
+                <a16:creationId xmlns:a16="http://schemas.microsoft.com/office/drawing/2014/main" id="{3C4649C9-5CF8-4A48-A40D-4D248FE16D2C}"/>
               </a:ext>
             </a:extLst>
           </p:cNvPr>
@@ -4995,8 +4880,8 @@
         </p:nvSpPr>
         <p:spPr>
           <a:xfrm>
-            <a:off x="0" y="688855"/>
-            <a:ext cx="7649737" cy="1077218"/>
+            <a:off x="4761571" y="1145395"/>
+            <a:ext cx="3780263" cy="1446550"/>
           </a:xfrm>
           <a:prstGeom prst="rect">
             <a:avLst/>
@@ -5010,32 +4895,48 @@
           <a:lstStyle/>
           <a:p>
             <a:r>
-              <a:rPr lang="en-US" sz="2400" dirty="0"/>
-              <a:t>This is the equivalent of </a:t>
-            </a:r>
-          </a:p>
-          <a:p>
-            <a:endParaRPr lang="en-US" sz="2000" dirty="0">
-              <a:solidFill>
-                <a:srgbClr val="002060"/>
-              </a:solidFill>
-            </a:endParaRPr>
-          </a:p>
-          <a:p>
-            <a:endParaRPr lang="en-US" sz="2000" dirty="0">
-              <a:solidFill>
-                <a:srgbClr val="002060"/>
-              </a:solidFill>
-            </a:endParaRPr>
-          </a:p>
-        </p:txBody>
-      </p:sp>
-      <p:sp>
-        <p:nvSpPr>
-          <p:cNvPr id="8" name="TextBox 7">
+              <a:rPr lang="en-US" sz="2200" dirty="0"/>
+              <a:t>You will need to terminate the program properly. </a:t>
+            </a:r>
+          </a:p>
+          <a:p>
+            <a:pPr marL="342900" indent="-342900">
+              <a:buFont typeface="Arial" panose="020B0604020202020204" pitchFamily="34" charset="0"/>
+              <a:buChar char="•"/>
+            </a:pPr>
+            <a:r>
+              <a:rPr lang="en-US" sz="2200" dirty="0">
+                <a:solidFill>
+                  <a:srgbClr val="002060"/>
+                </a:solidFill>
+              </a:rPr>
+              <a:t>This can be done with </a:t>
+            </a:r>
+            <a:r>
+              <a:rPr lang="en-US" sz="2200" dirty="0" err="1">
+                <a:solidFill>
+                  <a:srgbClr val="002060"/>
+                </a:solidFill>
+              </a:rPr>
+              <a:t>syscall</a:t>
+            </a:r>
+            <a:r>
+              <a:rPr lang="en-US" sz="2200" dirty="0">
+                <a:solidFill>
+                  <a:srgbClr val="002060"/>
+                </a:solidFill>
+              </a:rPr>
+              <a:t> 10.</a:t>
+            </a:r>
+          </a:p>
+        </p:txBody>
+      </p:sp>
+      <p:sp>
+        <p:nvSpPr>
+          <p:cNvPr id="6" name="TextBox 5">
             <a:extLst>
               <a:ext uri="{FF2B5EF4-FFF2-40B4-BE49-F238E27FC236}">
-                <a16:creationId xmlns:a16="http://schemas.microsoft.com/office/drawing/2014/main" id="{DC9A0A99-BCD0-4457-A169-70D75B17020E}"/>
+                <a16:creationId xmlns:a16="http://schemas.microsoft.com/office/drawing/2014/main" id="{42B39C6D-DB43-4F59-8538-2DE6EBB4C417}"/>
               </a:ext>
             </a:extLst>
           </p:cNvPr>
@@ -5044,13 +4945,18 @@
         </p:nvSpPr>
         <p:spPr>
           <a:xfrm>
-            <a:off x="390291" y="1377710"/>
-            <a:ext cx="7805854" cy="1446550"/>
+            <a:off x="4761571" y="2819506"/>
+            <a:ext cx="3780263" cy="2462213"/>
           </a:xfrm>
           <a:prstGeom prst="rect">
             <a:avLst/>
           </a:prstGeom>
           <a:noFill/>
+          <a:ln>
+            <a:solidFill>
+              <a:schemeClr val="tx1"/>
+            </a:solidFill>
+          </a:ln>
         </p:spPr>
         <p:txBody>
           <a:bodyPr wrap="square" rtlCol="0">
@@ -5059,245 +4965,21 @@
           <a:lstStyle/>
           <a:p>
             <a:r>
-              <a:rPr lang="en-US" sz="2200" dirty="0">
-                <a:solidFill>
-                  <a:srgbClr val="002060"/>
-                </a:solidFill>
-                <a:latin typeface="Consolas" panose="020B0609020204030204" pitchFamily="49" charset="0"/>
-                <a:cs typeface="Consolas" panose="020B0609020204030204" pitchFamily="49" charset="0"/>
-              </a:rPr>
-              <a:t>public static void main (String[] </a:t>
-            </a:r>
-            <a:r>
-              <a:rPr lang="en-US" sz="2200" dirty="0" err="1">
-                <a:solidFill>
-                  <a:srgbClr val="002060"/>
-                </a:solidFill>
-                <a:latin typeface="Consolas" panose="020B0609020204030204" pitchFamily="49" charset="0"/>
-                <a:cs typeface="Consolas" panose="020B0609020204030204" pitchFamily="49" charset="0"/>
-              </a:rPr>
-              <a:t>args</a:t>
-            </a:r>
-            <a:r>
-              <a:rPr lang="en-US" sz="2200" dirty="0">
-                <a:solidFill>
-                  <a:srgbClr val="002060"/>
-                </a:solidFill>
-                <a:latin typeface="Consolas" panose="020B0609020204030204" pitchFamily="49" charset="0"/>
-                <a:cs typeface="Consolas" panose="020B0609020204030204" pitchFamily="49" charset="0"/>
-              </a:rPr>
-              <a:t>) {	</a:t>
-            </a:r>
-          </a:p>
-          <a:p>
-            <a:r>
-              <a:rPr lang="en-US" sz="2200" dirty="0">
-                <a:solidFill>
-                  <a:srgbClr val="002060"/>
-                </a:solidFill>
-                <a:latin typeface="Consolas" panose="020B0609020204030204" pitchFamily="49" charset="0"/>
-                <a:cs typeface="Consolas" panose="020B0609020204030204" pitchFamily="49" charset="0"/>
-              </a:rPr>
-              <a:t>	</a:t>
-            </a:r>
-            <a:r>
-              <a:rPr lang="en-US" sz="2200" dirty="0" err="1">
-                <a:solidFill>
-                  <a:srgbClr val="002060"/>
-                </a:solidFill>
-                <a:latin typeface="Consolas" panose="020B0609020204030204" pitchFamily="49" charset="0"/>
-                <a:cs typeface="Consolas" panose="020B0609020204030204" pitchFamily="49" charset="0"/>
-              </a:rPr>
-              <a:t>int</a:t>
-            </a:r>
-            <a:r>
-              <a:rPr lang="en-US" sz="2200" dirty="0">
-                <a:solidFill>
-                  <a:srgbClr val="002060"/>
-                </a:solidFill>
-                <a:latin typeface="Consolas" panose="020B0609020204030204" pitchFamily="49" charset="0"/>
-                <a:cs typeface="Consolas" panose="020B0609020204030204" pitchFamily="49" charset="0"/>
-              </a:rPr>
-              <a:t> </a:t>
-            </a:r>
-            <a:r>
-              <a:rPr lang="en-US" sz="2200" dirty="0" err="1">
-                <a:solidFill>
-                  <a:srgbClr val="002060"/>
-                </a:solidFill>
-                <a:latin typeface="Consolas" panose="020B0609020204030204" pitchFamily="49" charset="0"/>
-                <a:cs typeface="Consolas" panose="020B0609020204030204" pitchFamily="49" charset="0"/>
-              </a:rPr>
-              <a:t>i</a:t>
-            </a:r>
-            <a:r>
-              <a:rPr lang="en-US" sz="2200" dirty="0">
-                <a:solidFill>
-                  <a:srgbClr val="002060"/>
-                </a:solidFill>
-                <a:latin typeface="Consolas" panose="020B0609020204030204" pitchFamily="49" charset="0"/>
-                <a:cs typeface="Consolas" panose="020B0609020204030204" pitchFamily="49" charset="0"/>
-              </a:rPr>
-              <a:t> = 1234;</a:t>
-            </a:r>
-          </a:p>
-          <a:p>
-            <a:r>
-              <a:rPr lang="en-US" sz="2200" dirty="0">
-                <a:solidFill>
-                  <a:srgbClr val="002060"/>
-                </a:solidFill>
-                <a:latin typeface="Consolas" panose="020B0609020204030204" pitchFamily="49" charset="0"/>
-                <a:cs typeface="Consolas" panose="020B0609020204030204" pitchFamily="49" charset="0"/>
-              </a:rPr>
-              <a:t>	</a:t>
-            </a:r>
-            <a:r>
-              <a:rPr lang="en-US" sz="2200" dirty="0" err="1">
-                <a:solidFill>
-                  <a:srgbClr val="002060"/>
-                </a:solidFill>
-                <a:latin typeface="Consolas" panose="020B0609020204030204" pitchFamily="49" charset="0"/>
-                <a:cs typeface="Consolas" panose="020B0609020204030204" pitchFamily="49" charset="0"/>
-              </a:rPr>
-              <a:t>printInt</a:t>
-            </a:r>
-            <a:r>
-              <a:rPr lang="en-US" sz="2200" dirty="0">
-                <a:solidFill>
-                  <a:srgbClr val="002060"/>
-                </a:solidFill>
-                <a:latin typeface="Consolas" panose="020B0609020204030204" pitchFamily="49" charset="0"/>
-                <a:cs typeface="Consolas" panose="020B0609020204030204" pitchFamily="49" charset="0"/>
-              </a:rPr>
-              <a:t>(</a:t>
-            </a:r>
-            <a:r>
-              <a:rPr lang="en-US" sz="2200" dirty="0" err="1">
-                <a:solidFill>
-                  <a:srgbClr val="002060"/>
-                </a:solidFill>
-                <a:latin typeface="Consolas" panose="020B0609020204030204" pitchFamily="49" charset="0"/>
-                <a:cs typeface="Consolas" panose="020B0609020204030204" pitchFamily="49" charset="0"/>
-              </a:rPr>
-              <a:t>i</a:t>
-            </a:r>
-            <a:r>
-              <a:rPr lang="en-US" sz="2200" dirty="0">
-                <a:solidFill>
-                  <a:srgbClr val="002060"/>
-                </a:solidFill>
-                <a:latin typeface="Consolas" panose="020B0609020204030204" pitchFamily="49" charset="0"/>
-                <a:cs typeface="Consolas" panose="020B0609020204030204" pitchFamily="49" charset="0"/>
-              </a:rPr>
-              <a:t>);</a:t>
-            </a:r>
-          </a:p>
-          <a:p>
-            <a:r>
-              <a:rPr lang="en-US" sz="2200" dirty="0">
-                <a:solidFill>
-                  <a:srgbClr val="002060"/>
-                </a:solidFill>
-                <a:latin typeface="Consolas" panose="020B0609020204030204" pitchFamily="49" charset="0"/>
-                <a:cs typeface="Consolas" panose="020B0609020204030204" pitchFamily="49" charset="0"/>
-              </a:rPr>
-              <a:t>}</a:t>
-            </a:r>
-          </a:p>
-        </p:txBody>
-      </p:sp>
-      <p:sp>
-        <p:nvSpPr>
-          <p:cNvPr id="9" name="TextBox 8">
-            <a:extLst>
-              <a:ext uri="{FF2B5EF4-FFF2-40B4-BE49-F238E27FC236}">
-                <a16:creationId xmlns:a16="http://schemas.microsoft.com/office/drawing/2014/main" id="{329920B4-D9CE-4804-A1D1-FDB15C704BE7}"/>
-              </a:ext>
-            </a:extLst>
-          </p:cNvPr>
-          <p:cNvSpPr txBox="1"/>
-          <p:nvPr/>
-        </p:nvSpPr>
-        <p:spPr>
-          <a:xfrm>
-            <a:off x="390291" y="3051450"/>
-            <a:ext cx="7649737" cy="1938992"/>
-          </a:xfrm>
-          <a:prstGeom prst="rect">
-            <a:avLst/>
-          </a:prstGeom>
-          <a:noFill/>
-        </p:spPr>
-        <p:txBody>
-          <a:bodyPr wrap="square" rtlCol="0">
-            <a:spAutoFit/>
-          </a:bodyPr>
-          <a:lstStyle/>
-          <a:p>
-            <a:pPr marL="342900" indent="-342900">
-              <a:buFont typeface="Arial" panose="020B0604020202020204" pitchFamily="34" charset="0"/>
-              <a:buChar char="•"/>
-            </a:pPr>
-            <a:r>
-              <a:rPr lang="en-US" sz="2400" dirty="0"/>
-              <a:t>The lab will show you how to call a function with “</a:t>
-            </a:r>
-            <a:r>
-              <a:rPr lang="en-US" sz="2400" dirty="0" err="1"/>
-              <a:t>jal</a:t>
-            </a:r>
-            <a:r>
-              <a:rPr lang="en-US" sz="2400" dirty="0"/>
-              <a:t>”</a:t>
-            </a:r>
-          </a:p>
-          <a:p>
-            <a:pPr marL="342900" indent="-342900">
-              <a:buFont typeface="Arial" panose="020B0604020202020204" pitchFamily="34" charset="0"/>
-              <a:buChar char="•"/>
-            </a:pPr>
-            <a:r>
-              <a:rPr lang="en-US" sz="2400" dirty="0" err="1"/>
-              <a:t>jal</a:t>
-            </a:r>
-            <a:r>
-              <a:rPr lang="en-US" sz="2400" dirty="0"/>
-              <a:t> = jump and link</a:t>
-            </a:r>
-          </a:p>
-          <a:p>
-            <a:pPr marL="342900" indent="-342900">
-              <a:buFont typeface="Arial" panose="020B0604020202020204" pitchFamily="34" charset="0"/>
-              <a:buChar char="•"/>
-            </a:pPr>
-            <a:r>
-              <a:rPr lang="en-US" sz="2400" dirty="0"/>
-              <a:t>This will “jump” to the code located at the provided function label.  “Link” will place the return address (the line after the </a:t>
-            </a:r>
-            <a:r>
-              <a:rPr lang="en-US" sz="2400" dirty="0" err="1"/>
-              <a:t>jal</a:t>
-            </a:r>
-            <a:r>
-              <a:rPr lang="en-US" sz="2400" dirty="0"/>
-              <a:t> command) in the </a:t>
-            </a:r>
-            <a:r>
-              <a:rPr lang="en-US" sz="2400" dirty="0" err="1"/>
-              <a:t>ra</a:t>
-            </a:r>
-            <a:r>
-              <a:rPr lang="en-US" sz="2400" dirty="0"/>
-              <a:t> register.</a:t>
-            </a:r>
+              <a:rPr lang="en-US" sz="2200" u="sng" dirty="0"/>
+              <a:t>Final reminder</a:t>
+            </a:r>
+            <a:r>
+              <a:rPr lang="en-US" sz="2200" dirty="0"/>
+              <a:t>: MIPS will continue to execute the next instruction on the screen (that is, immediately below, at the next memory address) unless you tell it to do otherwise with a jump or branch.</a:t>
+            </a:r>
+            <a:endParaRPr lang="en-US" sz="2200" u="sng" dirty="0"/>
           </a:p>
         </p:txBody>
       </p:sp>
     </p:spTree>
     <p:extLst>
       <p:ext uri="{BB962C8B-B14F-4D97-AF65-F5344CB8AC3E}">
-        <p14:creationId xmlns:p14="http://schemas.microsoft.com/office/powerpoint/2010/main" val="4231827740"/>
+        <p14:creationId xmlns:p14="http://schemas.microsoft.com/office/powerpoint/2010/main" val="3705858122"/>
       </p:ext>
     </p:extLst>
   </p:cSld>
@@ -5333,7 +5015,7 @@
         <p:spPr>
           <a:xfrm>
             <a:off x="0" y="0"/>
-            <a:ext cx="9054790" cy="523220"/>
+            <a:ext cx="8541834" cy="523220"/>
           </a:xfrm>
           <a:prstGeom prst="rect">
             <a:avLst/>
@@ -5351,17 +5033,17 @@
                   <a:srgbClr val="002060"/>
                 </a:solidFill>
               </a:rPr>
-              <a:t>Lab #1 Highlights: Writing a newline function</a:t>
-            </a:r>
-          </a:p>
-        </p:txBody>
-      </p:sp>
-      <p:sp>
-        <p:nvSpPr>
-          <p:cNvPr id="9" name="TextBox 8">
+              <a:t>Lab #2: In class check-off</a:t>
+            </a:r>
+          </a:p>
+        </p:txBody>
+      </p:sp>
+      <p:sp>
+        <p:nvSpPr>
+          <p:cNvPr id="4" name="TextBox 3">
             <a:extLst>
               <a:ext uri="{FF2B5EF4-FFF2-40B4-BE49-F238E27FC236}">
-                <a16:creationId xmlns:a16="http://schemas.microsoft.com/office/drawing/2014/main" id="{329920B4-D9CE-4804-A1D1-FDB15C704BE7}"/>
+                <a16:creationId xmlns:a16="http://schemas.microsoft.com/office/drawing/2014/main" id="{3C4649C9-5CF8-4A48-A40D-4D248FE16D2C}"/>
               </a:ext>
             </a:extLst>
           </p:cNvPr>
@@ -5370,8 +5052,8 @@
         </p:nvSpPr>
         <p:spPr>
           <a:xfrm>
-            <a:off x="334535" y="838200"/>
-            <a:ext cx="7649737" cy="3046988"/>
+            <a:off x="680225" y="838200"/>
+            <a:ext cx="6601521" cy="2677656"/>
           </a:xfrm>
           <a:prstGeom prst="rect">
             <a:avLst/>
@@ -5384,53 +5066,43 @@
           </a:bodyPr>
           <a:lstStyle/>
           <a:p>
-            <a:pPr marL="342900" indent="-342900">
-              <a:buFont typeface="Arial" panose="020B0604020202020204" pitchFamily="34" charset="0"/>
-              <a:buChar char="•"/>
-            </a:pPr>
             <a:r>
               <a:rPr lang="en-US" sz="2400" dirty="0"/>
-              <a:t>This will be a process similar to what you did for printing an integer, except it will not be necessary for the user to supply an argument (since it will always print a newline character)</a:t>
-            </a:r>
-          </a:p>
-          <a:p>
-            <a:pPr marL="342900" indent="-342900">
-              <a:buFont typeface="Arial" panose="020B0604020202020204" pitchFamily="34" charset="0"/>
-              <a:buChar char="•"/>
-            </a:pPr>
+              <a:t>If you are finished, your lab can be checked during recitation.</a:t>
+            </a:r>
+          </a:p>
+          <a:p>
             <a:endParaRPr lang="en-US" sz="2400" dirty="0"/>
           </a:p>
           <a:p>
-            <a:pPr marL="342900" indent="-342900">
-              <a:buFont typeface="Arial" panose="020B0604020202020204" pitchFamily="34" charset="0"/>
-              <a:buChar char="•"/>
-            </a:pPr>
             <a:r>
               <a:rPr lang="en-US" sz="2400" dirty="0"/>
-              <a:t>Newline character = ‘\n’  </a:t>
-            </a:r>
-          </a:p>
-          <a:p>
-            <a:pPr marL="800100" lvl="1" indent="-342900">
-              <a:buFont typeface="Arial" panose="020B0604020202020204" pitchFamily="34" charset="0"/>
-              <a:buChar char="•"/>
-            </a:pPr>
+              <a:t>You will be asked to run it twice, and briefly show your MIPS code.</a:t>
+            </a:r>
+          </a:p>
+          <a:p>
+            <a:endParaRPr lang="en-US" sz="2400" dirty="0"/>
+          </a:p>
+          <a:p>
             <a:r>
               <a:rPr lang="en-US" sz="2400" dirty="0"/>
-              <a:t>Be sure to use single quotes and the “print character” </a:t>
+              <a:t>Remember you must still submit on </a:t>
             </a:r>
             <a:r>
               <a:rPr lang="en-US" sz="2400" dirty="0" err="1"/>
-              <a:t>syscall</a:t>
-            </a:r>
-            <a:endParaRPr lang="en-US" sz="2400" dirty="0"/>
+              <a:t>Courseweb</a:t>
+            </a:r>
+            <a:r>
+              <a:rPr lang="en-US" sz="2400" dirty="0"/>
+              <a:t>!</a:t>
+            </a:r>
           </a:p>
         </p:txBody>
       </p:sp>
     </p:spTree>
     <p:extLst>
       <p:ext uri="{BB962C8B-B14F-4D97-AF65-F5344CB8AC3E}">
-        <p14:creationId xmlns:p14="http://schemas.microsoft.com/office/powerpoint/2010/main" val="155294319"/>
+        <p14:creationId xmlns:p14="http://schemas.microsoft.com/office/powerpoint/2010/main" val="2445890668"/>
       </p:ext>
     </p:extLst>
   </p:cSld>
@@ -5516,7 +5188,15 @@
             </a:r>
             <a:r>
               <a:rPr lang="en-US" sz="2400" dirty="0"/>
-              <a:t>: Karin Cox</a:t>
+              <a:t>: Karin Cox (Monday 12 pm recitation only; grader is </a:t>
+            </a:r>
+            <a:r>
+              <a:rPr lang="en-US" sz="2400" dirty="0" err="1"/>
+              <a:t>Yuyu</a:t>
+            </a:r>
+            <a:r>
+              <a:rPr lang="en-US" sz="2400" dirty="0"/>
+              <a:t> Zhou)</a:t>
             </a:r>
           </a:p>
           <a:p>
@@ -5564,15 +5244,7 @@
             </a:r>
             <a:r>
               <a:rPr lang="en-US" sz="2400" dirty="0"/>
-              <a:t>: </a:t>
-            </a:r>
-            <a:r>
-              <a:rPr lang="pl-PL" sz="2400" dirty="0"/>
-              <a:t>M </a:t>
-            </a:r>
-            <a:r>
-              <a:rPr lang="en-US" sz="2400" dirty="0"/>
-              <a:t>11:00-12:00 PM; M 1:00-3:00 PM; </a:t>
+              <a:t>: M 1:00-3:00 PM; </a:t>
             </a:r>
             <a:r>
               <a:rPr lang="pl-PL" sz="2400" dirty="0"/>
@@ -5624,7 +5296,7 @@
         <p:spPr>
           <a:xfrm>
             <a:off x="0" y="0"/>
-            <a:ext cx="8134066" cy="523220"/>
+            <a:ext cx="8134066" cy="954107"/>
           </a:xfrm>
           <a:prstGeom prst="rect">
             <a:avLst/>
@@ -5642,7 +5314,7 @@
                   <a:srgbClr val="002060"/>
                 </a:solidFill>
               </a:rPr>
-              <a:t>Recitation format</a:t>
+              <a:t>Recitation format (following from the Labs/Recitation section of the syllabus)</a:t>
             </a:r>
             <a:r>
               <a:rPr lang="en-US" sz="2800" dirty="0">
@@ -5663,8 +5335,8 @@
         </p:nvSpPr>
         <p:spPr>
           <a:xfrm>
-            <a:off x="435314" y="709246"/>
-            <a:ext cx="8263209" cy="3416320"/>
+            <a:off x="0" y="982663"/>
+            <a:ext cx="8798312" cy="5632311"/>
           </a:xfrm>
           <a:prstGeom prst="rect">
             <a:avLst/>
@@ -5682,7 +5354,7 @@
             </a:pPr>
             <a:r>
               <a:rPr lang="en-US" sz="2400" dirty="0"/>
-              <a:t>Attendance is optional. </a:t>
+              <a:t>A sign in sheet will be passed around at the beginning of lab.  Be sure to sign in!</a:t>
             </a:r>
           </a:p>
           <a:p>
@@ -5699,7 +5371,7 @@
             </a:pPr>
             <a:r>
               <a:rPr lang="en-US" sz="2400" dirty="0"/>
-              <a:t>Emphasis will be placed on allowing time for questions / help with labs. </a:t>
+              <a:t>If you do not attend the recitation corresponding to a lab, 50% will be deducted from that lab.</a:t>
             </a:r>
           </a:p>
           <a:p>
@@ -5715,8 +5387,20 @@
               <a:buChar char="•"/>
             </a:pPr>
             <a:r>
+              <a:rPr lang="en-US" sz="2400" u="sng" dirty="0"/>
+              <a:t>Submit all labs, via </a:t>
+            </a:r>
+            <a:r>
+              <a:rPr lang="en-US" sz="2400" u="sng" dirty="0" err="1"/>
+              <a:t>Courseweb</a:t>
+            </a:r>
+            <a:r>
+              <a:rPr lang="en-US" sz="2400" u="sng" dirty="0"/>
+              <a:t>, by the deadline</a:t>
+            </a:r>
+            <a:r>
               <a:rPr lang="en-US" sz="2400" dirty="0"/>
-              <a:t>Aspects of the lab will be highlighted at the start of the recitation. </a:t>
+              <a:t>.</a:t>
             </a:r>
           </a:p>
           <a:p>
@@ -5733,8 +5417,44 @@
             </a:pPr>
             <a:r>
               <a:rPr lang="en-US" sz="2400" dirty="0"/>
-              <a:t>In-depth presentations can be prepared on request.</a:t>
-            </a:r>
+              <a:t>Labs can also be “checked off” in class.  If the lab was completed accurately, this information will be passed on to the grader.  However, the lab </a:t>
+            </a:r>
+            <a:r>
+              <a:rPr lang="en-US" sz="2400" u="sng" dirty="0"/>
+              <a:t>should still be submitted through </a:t>
+            </a:r>
+            <a:r>
+              <a:rPr lang="en-US" sz="2400" u="sng" dirty="0" err="1"/>
+              <a:t>Courseweb</a:t>
+            </a:r>
+            <a:r>
+              <a:rPr lang="en-US" sz="2400" dirty="0"/>
+              <a:t>.</a:t>
+            </a:r>
+          </a:p>
+          <a:p>
+            <a:pPr marL="342900" indent="-342900">
+              <a:buFont typeface="Arial" panose="020B0604020202020204" pitchFamily="34" charset="0"/>
+              <a:buChar char="•"/>
+            </a:pPr>
+            <a:endParaRPr lang="en-US" sz="2400" dirty="0"/>
+          </a:p>
+          <a:p>
+            <a:pPr marL="342900" indent="-342900">
+              <a:buFont typeface="Arial" panose="020B0604020202020204" pitchFamily="34" charset="0"/>
+              <a:buChar char="•"/>
+            </a:pPr>
+            <a:r>
+              <a:rPr lang="en-US" sz="2400" dirty="0"/>
+              <a:t>A brief presentation on the lab will be given at the start of class.  The rest of the time will be available for individual questions.</a:t>
+            </a:r>
+          </a:p>
+          <a:p>
+            <a:pPr marL="342900" indent="-342900">
+              <a:buFont typeface="Arial" panose="020B0604020202020204" pitchFamily="34" charset="0"/>
+              <a:buChar char="•"/>
+            </a:pPr>
+            <a:endParaRPr lang="en-US" sz="2400" dirty="0"/>
           </a:p>
         </p:txBody>
       </p:sp>
@@ -5809,7 +5529,7 @@
         <p:spPr>
           <a:xfrm>
             <a:off x="435315" y="709246"/>
-            <a:ext cx="8201594" cy="3416320"/>
+            <a:ext cx="8201594" cy="2677656"/>
           </a:xfrm>
           <a:prstGeom prst="rect">
             <a:avLst/>
@@ -5839,7 +5559,7 @@
               <a:rPr lang="en-US" sz="2400" dirty="0">
                 <a:hlinkClick r:id="rId2"/>
               </a:rPr>
-              <a:t>https://github.com/kc13/CS447JB</a:t>
+              <a:t>https://github.com/kc13/CS447TK</a:t>
             </a:r>
             <a:endParaRPr lang="en-US" sz="2400" dirty="0"/>
           </a:p>
@@ -5855,54 +5575,8 @@
               <a:rPr lang="en-US" sz="2400" dirty="0">
                 <a:sym typeface="Wingdings" panose="05000000000000000000" pitchFamily="2" charset="2"/>
               </a:rPr>
-              <a:t>This repository will include recitation slides, and possibly other helpful material.   Use of this information is optional.</a:t>
-            </a:r>
-          </a:p>
-          <a:p>
-            <a:endParaRPr lang="en-US" sz="2400" dirty="0">
-              <a:sym typeface="Wingdings" panose="05000000000000000000" pitchFamily="2" charset="2"/>
-            </a:endParaRPr>
-          </a:p>
-          <a:p>
-            <a:pPr marL="342900" indent="-342900">
-              <a:buFont typeface="Wingdings" panose="05000000000000000000" pitchFamily="2" charset="2"/>
-              <a:buChar char="à"/>
-            </a:pPr>
-            <a:r>
-              <a:rPr lang="en-US" sz="2400" dirty="0">
-                <a:sym typeface="Wingdings" panose="05000000000000000000" pitchFamily="2" charset="2"/>
-              </a:rPr>
-              <a:t>This repository is independent of the </a:t>
-            </a:r>
-            <a:r>
-              <a:rPr lang="en-US" sz="2400" dirty="0" err="1">
-                <a:sym typeface="Wingdings" panose="05000000000000000000" pitchFamily="2" charset="2"/>
-              </a:rPr>
-              <a:t>Github</a:t>
-            </a:r>
-            <a:r>
-              <a:rPr lang="en-US" sz="2400" dirty="0">
-                <a:sym typeface="Wingdings" panose="05000000000000000000" pitchFamily="2" charset="2"/>
-              </a:rPr>
-              <a:t> “</a:t>
-            </a:r>
-            <a:r>
-              <a:rPr lang="en-US" sz="2400" dirty="0" err="1">
-                <a:sym typeface="Wingdings" panose="05000000000000000000" pitchFamily="2" charset="2"/>
-              </a:rPr>
-              <a:t>Gists</a:t>
-            </a:r>
-            <a:r>
-              <a:rPr lang="en-US" sz="2400" dirty="0">
-                <a:sym typeface="Wingdings" panose="05000000000000000000" pitchFamily="2" charset="2"/>
-              </a:rPr>
-              <a:t>” used for the lab instructions. </a:t>
-            </a:r>
-          </a:p>
-          <a:p>
-            <a:endParaRPr lang="en-US" sz="2400" dirty="0">
-              <a:sym typeface="Wingdings" panose="05000000000000000000" pitchFamily="2" charset="2"/>
-            </a:endParaRPr>
+              <a:t>This repository will include recitation slides, and possibly other helpful material.   Use of this information is optional.  The lab instructions provide all the information that is essential for completing the lab.</a:t>
+            </a:r>
           </a:p>
         </p:txBody>
       </p:sp>
@@ -5963,21 +5637,27 @@
                   <a:srgbClr val="002060"/>
                 </a:solidFill>
               </a:rPr>
-              <a:t>Questionnaire (also optional):</a:t>
-            </a:r>
-          </a:p>
-        </p:txBody>
-      </p:sp>
-      <p:sp>
-        <p:nvSpPr>
-          <p:cNvPr id="6" name="TextBox 5"/>
+              <a:t>Lab #2 highlights</a:t>
+            </a:r>
+          </a:p>
+        </p:txBody>
+      </p:sp>
+      <p:sp>
+        <p:nvSpPr>
+          <p:cNvPr id="4" name="TextBox 3">
+            <a:extLst>
+              <a:ext uri="{FF2B5EF4-FFF2-40B4-BE49-F238E27FC236}">
+                <a16:creationId xmlns:a16="http://schemas.microsoft.com/office/drawing/2014/main" id="{8882E7DC-FE30-4AE7-B38A-A32475F8D4D8}"/>
+              </a:ext>
+            </a:extLst>
+          </p:cNvPr>
           <p:cNvSpPr txBox="1"/>
           <p:nvPr/>
         </p:nvSpPr>
         <p:spPr>
           <a:xfrm>
-            <a:off x="435314" y="709246"/>
-            <a:ext cx="8263209" cy="2677656"/>
+            <a:off x="435315" y="709246"/>
+            <a:ext cx="7698752" cy="4154984"/>
           </a:xfrm>
           <a:prstGeom prst="rect">
             <a:avLst/>
@@ -5991,7 +5671,7 @@
           <a:p>
             <a:r>
               <a:rPr lang="en-US" sz="2400" u="sng" dirty="0"/>
-              <a:t>Google form</a:t>
+              <a:t>Handout organization</a:t>
             </a:r>
             <a:r>
               <a:rPr lang="en-US" sz="2400" dirty="0"/>
@@ -5999,49 +5679,71 @@
             </a:r>
           </a:p>
           <a:p>
-            <a:r>
-              <a:rPr lang="en-US" sz="2400" dirty="0">
-                <a:hlinkClick r:id="rId2"/>
-              </a:rPr>
-              <a:t>https://goo.gl/forms/BNZMgUdqvoV6KSd52</a:t>
-            </a:r>
             <a:endParaRPr lang="en-US" sz="2400" dirty="0"/>
           </a:p>
           <a:p>
+            <a:pPr marL="342900" indent="-342900">
+              <a:buFont typeface="Arial" panose="020B0604020202020204" pitchFamily="34" charset="0"/>
+              <a:buChar char="•"/>
+            </a:pPr>
+            <a:r>
+              <a:rPr lang="en-US" sz="2400" dirty="0"/>
+              <a:t>Pages 1-4: Lots of helpful background information and examples</a:t>
+            </a:r>
+          </a:p>
+          <a:p>
+            <a:pPr marL="800100" lvl="1" indent="-342900">
+              <a:buFont typeface="Arial" panose="020B0604020202020204" pitchFamily="34" charset="0"/>
+              <a:buChar char="•"/>
+            </a:pPr>
+            <a:r>
+              <a:rPr lang="en-US" sz="2200" dirty="0"/>
+              <a:t>Three major themes: </a:t>
+            </a:r>
+            <a:r>
+              <a:rPr lang="en-US" sz="2200" dirty="0" err="1"/>
+              <a:t>syscalls</a:t>
+            </a:r>
+            <a:r>
+              <a:rPr lang="en-US" sz="2200" dirty="0"/>
+              <a:t>, jumps/branches, and comparisons</a:t>
+            </a:r>
+          </a:p>
+          <a:p>
+            <a:pPr marL="342900" indent="-342900">
+              <a:buFont typeface="Arial" panose="020B0604020202020204" pitchFamily="34" charset="0"/>
+              <a:buChar char="•"/>
+            </a:pPr>
             <a:endParaRPr lang="en-US" sz="2400" dirty="0"/>
           </a:p>
           <a:p>
             <a:pPr marL="342900" indent="-342900">
-              <a:buFont typeface="Wingdings" panose="05000000000000000000" pitchFamily="2" charset="2"/>
-              <a:buChar char="à"/>
+              <a:buFont typeface="Arial" panose="020B0604020202020204" pitchFamily="34" charset="0"/>
+              <a:buChar char="•"/>
             </a:pPr>
             <a:r>
-              <a:rPr lang="en-US" sz="2400" dirty="0">
-                <a:sym typeface="Wingdings" panose="05000000000000000000" pitchFamily="2" charset="2"/>
-              </a:rPr>
-              <a:t>Single, open ended question, where you can share your thoughts on what you might like to see in this recitation. </a:t>
+              <a:rPr lang="en-US" sz="2400" dirty="0"/>
+              <a:t>Pages 4-5: Description of the Lab assignment</a:t>
+            </a:r>
+          </a:p>
+          <a:p>
+            <a:pPr marL="800100" lvl="1" indent="-342900">
+              <a:buFont typeface="Arial" panose="020B0604020202020204" pitchFamily="34" charset="0"/>
+              <a:buChar char="•"/>
+            </a:pPr>
+            <a:r>
+              <a:rPr lang="en-US" sz="2200" dirty="0"/>
+              <a:t>The “Higher/Lower Game”</a:t>
             </a:r>
           </a:p>
           <a:p>
             <a:pPr marL="342900" indent="-342900">
-              <a:buFont typeface="Wingdings" panose="05000000000000000000" pitchFamily="2" charset="2"/>
-              <a:buChar char="à"/>
+              <a:buFont typeface="Arial" panose="020B0604020202020204" pitchFamily="34" charset="0"/>
+              <a:buChar char="•"/>
             </a:pPr>
-            <a:endParaRPr lang="en-US" sz="2400" dirty="0">
-              <a:sym typeface="Wingdings" panose="05000000000000000000" pitchFamily="2" charset="2"/>
-            </a:endParaRPr>
-          </a:p>
-          <a:p>
-            <a:pPr marL="342900" indent="-342900">
-              <a:buFont typeface="Wingdings" panose="05000000000000000000" pitchFamily="2" charset="2"/>
-              <a:buChar char="à"/>
-            </a:pPr>
-            <a:r>
-              <a:rPr lang="en-US" sz="2400" dirty="0">
-                <a:sym typeface="Wingdings" panose="05000000000000000000" pitchFamily="2" charset="2"/>
-              </a:rPr>
-              <a:t>Responses will be monitored over the next three weeks.</a:t>
-            </a:r>
+            <a:endParaRPr lang="en-US" sz="2400" dirty="0"/>
+          </a:p>
+          <a:p>
             <a:endParaRPr lang="en-US" sz="2400" dirty="0"/>
           </a:p>
         </p:txBody>
@@ -6049,7 +5751,7 @@
     </p:spTree>
     <p:extLst>
       <p:ext uri="{BB962C8B-B14F-4D97-AF65-F5344CB8AC3E}">
-        <p14:creationId xmlns:p14="http://schemas.microsoft.com/office/powerpoint/2010/main" val="1889123120"/>
+        <p14:creationId xmlns:p14="http://schemas.microsoft.com/office/powerpoint/2010/main" val="458783044"/>
       </p:ext>
     </p:extLst>
   </p:cSld>
@@ -6103,121 +5805,58 @@
                   <a:srgbClr val="002060"/>
                 </a:solidFill>
               </a:rPr>
-              <a:t>Textbook</a:t>
-            </a:r>
-          </a:p>
-        </p:txBody>
-      </p:sp>
-      <p:sp>
-        <p:nvSpPr>
-          <p:cNvPr id="6" name="TextBox 5"/>
-          <p:cNvSpPr txBox="1"/>
+              <a:t>Lab #2: </a:t>
+            </a:r>
+            <a:r>
+              <a:rPr lang="en-US" sz="2800" dirty="0" err="1">
+                <a:solidFill>
+                  <a:srgbClr val="002060"/>
+                </a:solidFill>
+              </a:rPr>
+              <a:t>Syscalls</a:t>
+            </a:r>
+            <a:endParaRPr lang="en-US" sz="2800" dirty="0">
+              <a:solidFill>
+                <a:srgbClr val="002060"/>
+              </a:solidFill>
+            </a:endParaRPr>
+          </a:p>
+        </p:txBody>
+      </p:sp>
+      <p:pic>
+        <p:nvPicPr>
+          <p:cNvPr id="12" name="Picture 11">
+            <a:extLst>
+              <a:ext uri="{FF2B5EF4-FFF2-40B4-BE49-F238E27FC236}">
+                <a16:creationId xmlns:a16="http://schemas.microsoft.com/office/drawing/2014/main" id="{8DA246F1-8DAB-4CE4-965C-B10E03CC0543}"/>
+              </a:ext>
+            </a:extLst>
+          </p:cNvPr>
+          <p:cNvPicPr>
+            <a:picLocks noChangeAspect="1"/>
+          </p:cNvPicPr>
           <p:nvPr/>
-        </p:nvSpPr>
-        <p:spPr>
-          <a:xfrm>
-            <a:off x="435314" y="709246"/>
-            <a:ext cx="8263209" cy="3046988"/>
+        </p:nvPicPr>
+        <p:blipFill>
+          <a:blip r:embed="rId2"/>
+          <a:stretch>
+            <a:fillRect/>
+          </a:stretch>
+        </p:blipFill>
+        <p:spPr>
+          <a:xfrm>
+            <a:off x="106996" y="795454"/>
+            <a:ext cx="8890723" cy="4289502"/>
           </a:xfrm>
           <a:prstGeom prst="rect">
             <a:avLst/>
           </a:prstGeom>
         </p:spPr>
-        <p:txBody>
-          <a:bodyPr wrap="square" rtlCol="0">
-            <a:spAutoFit/>
-          </a:bodyPr>
-          <a:lstStyle/>
-          <a:p>
-            <a:pPr marL="342900" indent="-342900">
-              <a:buFont typeface="Arial" panose="020B0604020202020204" pitchFamily="34" charset="0"/>
-              <a:buChar char="•"/>
-            </a:pPr>
-            <a:r>
-              <a:rPr lang="en-US" sz="2400" i="1" dirty="0"/>
-              <a:t>Computer Organization and Design</a:t>
-            </a:r>
-            <a:r>
-              <a:rPr lang="en-US" sz="2400" dirty="0"/>
-              <a:t> (Patterson and Hennessy)</a:t>
-            </a:r>
-          </a:p>
-          <a:p>
-            <a:endParaRPr lang="en-US" sz="2400" dirty="0"/>
-          </a:p>
-          <a:p>
-            <a:pPr marL="342900" indent="-342900">
-              <a:buFont typeface="Arial" panose="020B0604020202020204" pitchFamily="34" charset="0"/>
-              <a:buChar char="•"/>
-            </a:pPr>
-            <a:r>
-              <a:rPr lang="en-US" sz="2400" dirty="0"/>
-              <a:t>Not required for this class</a:t>
-            </a:r>
-          </a:p>
-          <a:p>
-            <a:pPr marL="342900" indent="-342900">
-              <a:buFont typeface="Arial" panose="020B0604020202020204" pitchFamily="34" charset="0"/>
-              <a:buChar char="•"/>
-            </a:pPr>
-            <a:endParaRPr lang="en-US" sz="2400" dirty="0"/>
-          </a:p>
-          <a:p>
-            <a:pPr marL="342900" indent="-342900">
-              <a:buFont typeface="Arial" panose="020B0604020202020204" pitchFamily="34" charset="0"/>
-              <a:buChar char="•"/>
-            </a:pPr>
-            <a:r>
-              <a:rPr lang="en-US" sz="2400" dirty="0"/>
-              <a:t>If you would find it helpful, note that the 4</a:t>
-            </a:r>
-            <a:r>
-              <a:rPr lang="en-US" sz="2400" baseline="30000" dirty="0"/>
-              <a:t>th</a:t>
-            </a:r>
-            <a:r>
-              <a:rPr lang="en-US" sz="2400" dirty="0"/>
-              <a:t> edition is available as an eBook, through the library.</a:t>
-            </a:r>
-          </a:p>
-          <a:p>
-            <a:pPr marL="800100" lvl="1" indent="-342900">
-              <a:buFont typeface="Arial" panose="020B0604020202020204" pitchFamily="34" charset="0"/>
-              <a:buChar char="•"/>
-            </a:pPr>
-            <a:r>
-              <a:rPr lang="en-US" sz="2400" dirty="0">
-                <a:solidFill>
-                  <a:schemeClr val="bg1">
-                    <a:lumMod val="50000"/>
-                  </a:schemeClr>
-                </a:solidFill>
-              </a:rPr>
-              <a:t>Look for the book with the green cover, published in 2012.</a:t>
-            </a:r>
-          </a:p>
-          <a:p>
-            <a:pPr marL="800100" lvl="1" indent="-342900">
-              <a:buFont typeface="Arial" panose="020B0604020202020204" pitchFamily="34" charset="0"/>
-              <a:buChar char="•"/>
-            </a:pPr>
-            <a:r>
-              <a:rPr lang="en-US" sz="2400" dirty="0">
-                <a:solidFill>
-                  <a:schemeClr val="bg1">
-                    <a:lumMod val="50000"/>
-                  </a:schemeClr>
-                </a:solidFill>
-              </a:rPr>
-              <a:t>The 2017 book is the ARM edition (not MIPS)</a:t>
-            </a:r>
-          </a:p>
-        </p:txBody>
-      </p:sp>
+      </p:pic>
     </p:spTree>
     <p:extLst>
       <p:ext uri="{BB962C8B-B14F-4D97-AF65-F5344CB8AC3E}">
-        <p14:creationId xmlns:p14="http://schemas.microsoft.com/office/powerpoint/2010/main" val="1649073116"/>
+        <p14:creationId xmlns:p14="http://schemas.microsoft.com/office/powerpoint/2010/main" val="3113507914"/>
       </p:ext>
     </p:extLst>
   </p:cSld>
@@ -6271,52 +5910,17 @@
                   <a:srgbClr val="002060"/>
                 </a:solidFill>
               </a:rPr>
-              <a:t>Lab #1 Highlights: Preparing MARS</a:t>
-            </a:r>
-          </a:p>
-        </p:txBody>
-      </p:sp>
-      <p:pic>
-        <p:nvPicPr>
-          <p:cNvPr id="7" name="Picture 6" descr="cs0447_2184_lab1.md - Mozilla Firefox">
+              <a:t>Lab #2: Jumps/Branches</a:t>
+            </a:r>
+          </a:p>
+        </p:txBody>
+      </p:sp>
+      <p:sp>
+        <p:nvSpPr>
+          <p:cNvPr id="4" name="TextBox 3">
             <a:extLst>
               <a:ext uri="{FF2B5EF4-FFF2-40B4-BE49-F238E27FC236}">
-                <a16:creationId xmlns:a16="http://schemas.microsoft.com/office/drawing/2014/main" id="{B6A861D3-464E-448A-9BB5-FCFAB6A0636A}"/>
-              </a:ext>
-            </a:extLst>
-          </p:cNvPr>
-          <p:cNvPicPr>
-            <a:picLocks noChangeAspect="1"/>
-          </p:cNvPicPr>
-          <p:nvPr/>
-        </p:nvPicPr>
-        <p:blipFill rotWithShape="1">
-          <a:blip r:embed="rId2">
-            <a:extLst>
-              <a:ext uri="{28A0092B-C50C-407E-A947-70E740481C1C}">
-                <a14:useLocalDpi xmlns:a14="http://schemas.microsoft.com/office/drawing/2010/main" val="0"/>
-              </a:ext>
-            </a:extLst>
-          </a:blip>
-          <a:srcRect l="18781" r="17317" b="46738"/>
-          <a:stretch/>
-        </p:blipFill>
-        <p:spPr>
-          <a:xfrm>
-            <a:off x="267628" y="701639"/>
-            <a:ext cx="7772400" cy="3511705"/>
-          </a:xfrm>
-          <a:prstGeom prst="rect">
-            <a:avLst/>
-          </a:prstGeom>
-        </p:spPr>
-      </p:pic>
-      <p:sp>
-        <p:nvSpPr>
-          <p:cNvPr id="8" name="TextBox 7">
-            <a:extLst>
-              <a:ext uri="{FF2B5EF4-FFF2-40B4-BE49-F238E27FC236}">
-                <a16:creationId xmlns:a16="http://schemas.microsoft.com/office/drawing/2014/main" id="{C4C61167-FD1D-4D90-977A-59137732256A}"/>
+                <a16:creationId xmlns:a16="http://schemas.microsoft.com/office/drawing/2014/main" id="{4197A70A-F7AC-41F8-AFF0-9B3450C3004D}"/>
               </a:ext>
             </a:extLst>
           </p:cNvPr>
@@ -6325,13 +5929,12 @@
         </p:nvSpPr>
         <p:spPr>
           <a:xfrm>
-            <a:off x="546410" y="4391763"/>
-            <a:ext cx="6858000" cy="1754326"/>
+            <a:off x="435315" y="709246"/>
+            <a:ext cx="7698752" cy="3785652"/>
           </a:xfrm>
           <a:prstGeom prst="rect">
             <a:avLst/>
           </a:prstGeom>
-          <a:noFill/>
         </p:spPr>
         <p:txBody>
           <a:bodyPr wrap="square" rtlCol="0">
@@ -6339,53 +5942,165 @@
           </a:bodyPr>
           <a:lstStyle/>
           <a:p>
-            <a:pPr marL="285750" indent="-285750">
+            <a:r>
+              <a:rPr lang="en-US" sz="2400" u="sng" dirty="0"/>
+              <a:t>Unconditional jumps</a:t>
+            </a:r>
+            <a:r>
+              <a:rPr lang="en-US" sz="2400" dirty="0"/>
+              <a:t>: See lab #1</a:t>
+            </a:r>
+          </a:p>
+          <a:p>
+            <a:pPr marL="342900" indent="-342900">
               <a:buFont typeface="Arial" panose="020B0604020202020204" pitchFamily="34" charset="0"/>
               <a:buChar char="•"/>
             </a:pPr>
             <a:r>
-              <a:rPr lang="en-US" dirty="0"/>
-              <a:t>Using the modified version (with the correct settings) will be important for this class.  This MARS version is different from the version on the lab machines.</a:t>
-            </a:r>
-          </a:p>
-          <a:p>
-            <a:pPr marL="742950" lvl="1" indent="-285750">
+              <a:rPr lang="en-US" sz="2400" dirty="0">
+                <a:latin typeface="Consolas" panose="020B0609020204030204" pitchFamily="49" charset="0"/>
+                <a:cs typeface="Consolas" panose="020B0609020204030204" pitchFamily="49" charset="0"/>
+              </a:rPr>
+              <a:t>j &lt;label&gt;</a:t>
+            </a:r>
+          </a:p>
+          <a:p>
+            <a:pPr marL="342900" indent="-342900">
               <a:buFont typeface="Arial" panose="020B0604020202020204" pitchFamily="34" charset="0"/>
               <a:buChar char="•"/>
             </a:pPr>
-            <a:r>
-              <a:rPr lang="en-US" dirty="0">
-                <a:solidFill>
-                  <a:srgbClr val="002060"/>
-                </a:solidFill>
-              </a:rPr>
-              <a:t>Be sure to confirm the settings, as instructed</a:t>
-            </a:r>
-          </a:p>
-          <a:p>
-            <a:pPr marL="742950" lvl="1" indent="-285750">
+            <a:endParaRPr lang="en-US" sz="2400" dirty="0"/>
+          </a:p>
+          <a:p>
+            <a:r>
+              <a:rPr lang="en-US" sz="2400" u="sng" dirty="0"/>
+              <a:t>Conditional branches</a:t>
+            </a:r>
+            <a:r>
+              <a:rPr lang="en-US" sz="2400" dirty="0"/>
+              <a:t>: See lecture slides for more info</a:t>
+            </a:r>
+          </a:p>
+          <a:p>
+            <a:pPr indent="-342900">
               <a:buFont typeface="Arial" panose="020B0604020202020204" pitchFamily="34" charset="0"/>
               <a:buChar char="•"/>
             </a:pPr>
             <a:r>
-              <a:rPr lang="en-US" dirty="0">
-                <a:solidFill>
-                  <a:srgbClr val="002060"/>
-                </a:solidFill>
-              </a:rPr>
-              <a:t>If you’re using the lab machines, you can save the .jar file to the desktop and click on it.</a:t>
-            </a:r>
-            <a:r>
-              <a:rPr lang="en-US" dirty="0"/>
+              <a:rPr lang="en-US" sz="2400" u="sng" dirty="0"/>
+              <a:t>Example</a:t>
+            </a:r>
+            <a:r>
+              <a:rPr lang="en-US" sz="2400" dirty="0"/>
+              <a:t>: </a:t>
+            </a:r>
+          </a:p>
+          <a:p>
+            <a:pPr lvl="1" indent="-342900">
+              <a:buFont typeface="Arial" panose="020B0604020202020204" pitchFamily="34" charset="0"/>
+              <a:buChar char="•"/>
+            </a:pPr>
+            <a:r>
+              <a:rPr lang="en-US" sz="2400" dirty="0" err="1">
+                <a:latin typeface="Consolas" panose="020B0609020204030204" pitchFamily="49" charset="0"/>
+                <a:cs typeface="Consolas" panose="020B0609020204030204" pitchFamily="49" charset="0"/>
+              </a:rPr>
+              <a:t>bne</a:t>
+            </a:r>
+            <a:r>
+              <a:rPr lang="en-US" sz="2400" dirty="0">
+                <a:latin typeface="Consolas" panose="020B0609020204030204" pitchFamily="49" charset="0"/>
+                <a:cs typeface="Consolas" panose="020B0609020204030204" pitchFamily="49" charset="0"/>
+              </a:rPr>
+              <a:t> $s0, $zero, </a:t>
+            </a:r>
+            <a:r>
+              <a:rPr lang="en-US" sz="2400" dirty="0" err="1">
+                <a:latin typeface="Consolas" panose="020B0609020204030204" pitchFamily="49" charset="0"/>
+                <a:cs typeface="Consolas" panose="020B0609020204030204" pitchFamily="49" charset="0"/>
+              </a:rPr>
+              <a:t>someLabel</a:t>
+            </a:r>
+            <a:endParaRPr lang="en-US" sz="2400" dirty="0">
+              <a:latin typeface="Consolas" panose="020B0609020204030204" pitchFamily="49" charset="0"/>
+              <a:cs typeface="Consolas" panose="020B0609020204030204" pitchFamily="49" charset="0"/>
+            </a:endParaRPr>
+          </a:p>
+          <a:p>
+            <a:pPr lvl="2" indent="-342900">
+              <a:buFont typeface="Arial" panose="020B0604020202020204" pitchFamily="34" charset="0"/>
+              <a:buChar char="•"/>
+            </a:pPr>
+            <a:r>
+              <a:rPr lang="en-US" sz="2400" dirty="0" err="1">
+                <a:latin typeface="Consolas" panose="020B0609020204030204" pitchFamily="49" charset="0"/>
+                <a:cs typeface="Consolas" panose="020B0609020204030204" pitchFamily="49" charset="0"/>
+              </a:rPr>
+              <a:t>bne</a:t>
+            </a:r>
+            <a:r>
+              <a:rPr lang="en-US" sz="2400" dirty="0">
+                <a:latin typeface="Consolas" panose="020B0609020204030204" pitchFamily="49" charset="0"/>
+                <a:cs typeface="Consolas" panose="020B0609020204030204" pitchFamily="49" charset="0"/>
+              </a:rPr>
               <a:t> </a:t>
             </a:r>
+            <a:r>
+              <a:rPr lang="en-US" sz="2400" dirty="0"/>
+              <a:t>= branch if not equal</a:t>
+            </a:r>
+          </a:p>
+          <a:p>
+            <a:pPr lvl="2" indent="-342900">
+              <a:buFont typeface="Arial" panose="020B0604020202020204" pitchFamily="34" charset="0"/>
+              <a:buChar char="•"/>
+            </a:pPr>
+            <a:r>
+              <a:rPr lang="en-US" sz="2400" dirty="0"/>
+              <a:t>Branch (jump) to </a:t>
+            </a:r>
+            <a:r>
+              <a:rPr lang="en-US" sz="2400" dirty="0" err="1"/>
+              <a:t>someLabel</a:t>
+            </a:r>
+            <a:r>
+              <a:rPr lang="en-US" sz="2400" dirty="0"/>
+              <a:t> if $s0 ≠ 0</a:t>
+            </a:r>
+          </a:p>
+          <a:p>
+            <a:pPr lvl="1" indent="-342900">
+              <a:buFont typeface="Arial" panose="020B0604020202020204" pitchFamily="34" charset="0"/>
+              <a:buChar char="•"/>
+            </a:pPr>
+            <a:r>
+              <a:rPr lang="en-US" sz="2400" dirty="0" err="1">
+                <a:latin typeface="Consolas" panose="020B0609020204030204" pitchFamily="49" charset="0"/>
+                <a:cs typeface="Consolas" panose="020B0609020204030204" pitchFamily="49" charset="0"/>
+              </a:rPr>
+              <a:t>beq</a:t>
+            </a:r>
+            <a:r>
+              <a:rPr lang="en-US" sz="2400" dirty="0">
+                <a:latin typeface="Consolas" panose="020B0609020204030204" pitchFamily="49" charset="0"/>
+                <a:cs typeface="Consolas" panose="020B0609020204030204" pitchFamily="49" charset="0"/>
+              </a:rPr>
+              <a:t> </a:t>
+            </a:r>
+            <a:r>
+              <a:rPr lang="en-US" sz="2400" dirty="0"/>
+              <a:t>= branch if equal</a:t>
+            </a:r>
+          </a:p>
+          <a:p>
+            <a:endParaRPr lang="en-US" sz="2400" dirty="0"/>
           </a:p>
         </p:txBody>
       </p:sp>
     </p:spTree>
     <p:extLst>
       <p:ext uri="{BB962C8B-B14F-4D97-AF65-F5344CB8AC3E}">
-        <p14:creationId xmlns:p14="http://schemas.microsoft.com/office/powerpoint/2010/main" val="2812305113"/>
+        <p14:creationId xmlns:p14="http://schemas.microsoft.com/office/powerpoint/2010/main" val="252571603"/>
       </p:ext>
     </p:extLst>
   </p:cSld>
@@ -6439,52 +6154,17 @@
                   <a:srgbClr val="002060"/>
                 </a:solidFill>
               </a:rPr>
-              <a:t>Lab #1 Highlights: Creating the “main” function</a:t>
-            </a:r>
-          </a:p>
-        </p:txBody>
-      </p:sp>
-      <p:pic>
-        <p:nvPicPr>
-          <p:cNvPr id="10" name="Picture 9" descr="cs0447_2184_lab1.md - Mozilla Firefox">
+              <a:t>Lab #2: Comparisons, and their use with branches</a:t>
+            </a:r>
+          </a:p>
+        </p:txBody>
+      </p:sp>
+      <p:sp>
+        <p:nvSpPr>
+          <p:cNvPr id="4" name="TextBox 3">
             <a:extLst>
               <a:ext uri="{FF2B5EF4-FFF2-40B4-BE49-F238E27FC236}">
-                <a16:creationId xmlns:a16="http://schemas.microsoft.com/office/drawing/2014/main" id="{AA0C30BE-6AF6-43F8-8537-3C5E3B2DA43D}"/>
-              </a:ext>
-            </a:extLst>
-          </p:cNvPr>
-          <p:cNvPicPr>
-            <a:picLocks noChangeAspect="1"/>
-          </p:cNvPicPr>
-          <p:nvPr/>
-        </p:nvPicPr>
-        <p:blipFill rotWithShape="1">
-          <a:blip r:embed="rId2">
-            <a:extLst>
-              <a:ext uri="{28A0092B-C50C-407E-A947-70E740481C1C}">
-                <a14:useLocalDpi xmlns:a14="http://schemas.microsoft.com/office/drawing/2010/main" val="0"/>
-              </a:ext>
-            </a:extLst>
-          </a:blip>
-          <a:srcRect l="17926" t="53487" r="19269" b="24466"/>
-          <a:stretch/>
-        </p:blipFill>
-        <p:spPr>
-          <a:xfrm>
-            <a:off x="111512" y="838200"/>
-            <a:ext cx="8686800" cy="1653015"/>
-          </a:xfrm>
-          <a:prstGeom prst="rect">
-            <a:avLst/>
-          </a:prstGeom>
-        </p:spPr>
-      </p:pic>
-      <p:sp>
-        <p:nvSpPr>
-          <p:cNvPr id="11" name="TextBox 10">
-            <a:extLst>
-              <a:ext uri="{FF2B5EF4-FFF2-40B4-BE49-F238E27FC236}">
-                <a16:creationId xmlns:a16="http://schemas.microsoft.com/office/drawing/2014/main" id="{DE91298D-63E2-482D-805E-375F482E27DB}"/>
+                <a16:creationId xmlns:a16="http://schemas.microsoft.com/office/drawing/2014/main" id="{4197A70A-F7AC-41F8-AFF0-9B3450C3004D}"/>
               </a:ext>
             </a:extLst>
           </p:cNvPr>
@@ -6493,13 +6173,12 @@
         </p:nvSpPr>
         <p:spPr>
           <a:xfrm>
-            <a:off x="836341" y="2810107"/>
-            <a:ext cx="6478859" cy="2739211"/>
+            <a:off x="435315" y="709246"/>
+            <a:ext cx="7698752" cy="1938992"/>
           </a:xfrm>
           <a:prstGeom prst="rect">
             <a:avLst/>
           </a:prstGeom>
-          <a:noFill/>
         </p:spPr>
         <p:txBody>
           <a:bodyPr wrap="square" rtlCol="0">
@@ -6507,92 +6186,196 @@
           </a:bodyPr>
           <a:lstStyle/>
           <a:p>
-            <a:pPr marL="285750" indent="-285750">
+            <a:r>
+              <a:rPr lang="en-US" sz="2400" u="sng" dirty="0"/>
+              <a:t>Set less than</a:t>
+            </a:r>
+            <a:r>
+              <a:rPr lang="en-US" sz="2400" dirty="0"/>
+              <a:t>: See lecture slides for more info</a:t>
+            </a:r>
+          </a:p>
+          <a:p>
+            <a:pPr indent="-342900">
               <a:buFont typeface="Arial" panose="020B0604020202020204" pitchFamily="34" charset="0"/>
               <a:buChar char="•"/>
             </a:pPr>
             <a:r>
-              <a:rPr lang="en-US" sz="2200" dirty="0"/>
-              <a:t>Be sure to type “.</a:t>
-            </a:r>
-            <a:r>
-              <a:rPr lang="en-US" sz="2200" dirty="0" err="1"/>
-              <a:t>globl</a:t>
-            </a:r>
-            <a:r>
-              <a:rPr lang="en-US" sz="2200" dirty="0"/>
-              <a:t>” (not .global)</a:t>
-            </a:r>
-          </a:p>
-          <a:p>
-            <a:pPr marL="285750" indent="-285750">
+              <a:rPr lang="en-US" sz="2400" u="sng" dirty="0"/>
+              <a:t>Example</a:t>
+            </a:r>
+            <a:r>
+              <a:rPr lang="en-US" sz="2400" dirty="0"/>
+              <a:t>: </a:t>
+            </a:r>
+          </a:p>
+          <a:p>
+            <a:pPr lvl="1" indent="-342900">
               <a:buFont typeface="Arial" panose="020B0604020202020204" pitchFamily="34" charset="0"/>
               <a:buChar char="•"/>
             </a:pPr>
-            <a:endParaRPr lang="en-US" sz="2000" dirty="0"/>
-          </a:p>
-          <a:p>
-            <a:pPr marL="285750" indent="-285750">
+            <a:r>
+              <a:rPr lang="en-US" sz="2400" dirty="0" err="1">
+                <a:latin typeface="Consolas" panose="020B0609020204030204" pitchFamily="49" charset="0"/>
+                <a:cs typeface="Consolas" panose="020B0609020204030204" pitchFamily="49" charset="0"/>
+              </a:rPr>
+              <a:t>slt</a:t>
+            </a:r>
+            <a:r>
+              <a:rPr lang="en-US" sz="2400" dirty="0">
+                <a:latin typeface="Consolas" panose="020B0609020204030204" pitchFamily="49" charset="0"/>
+                <a:cs typeface="Consolas" panose="020B0609020204030204" pitchFamily="49" charset="0"/>
+              </a:rPr>
+              <a:t> $t2, $t1, $t0</a:t>
+            </a:r>
+          </a:p>
+          <a:p>
+            <a:pPr lvl="2" indent="-342900">
               <a:buFont typeface="Arial" panose="020B0604020202020204" pitchFamily="34" charset="0"/>
               <a:buChar char="•"/>
             </a:pPr>
             <a:r>
-              <a:rPr lang="en-US" sz="2000" dirty="0"/>
-              <a:t>If you are curious what this means: </a:t>
-            </a:r>
-          </a:p>
-          <a:p>
-            <a:pPr marL="742950" lvl="1" indent="-285750">
+              <a:rPr lang="en-US" sz="2400" dirty="0"/>
+              <a:t>If $t1 &lt; $t0, set $t2 to 1</a:t>
+            </a:r>
+          </a:p>
+          <a:p>
+            <a:pPr lvl="2" indent="-342900">
               <a:buFont typeface="Arial" panose="020B0604020202020204" pitchFamily="34" charset="0"/>
               <a:buChar char="•"/>
             </a:pPr>
             <a:r>
-              <a:rPr lang="en-US" dirty="0"/>
-              <a:t>“.</a:t>
-            </a:r>
-            <a:r>
-              <a:rPr lang="en-US" dirty="0" err="1"/>
-              <a:t>globl</a:t>
-            </a:r>
-            <a:r>
-              <a:rPr lang="en-US" dirty="0"/>
-              <a:t>” is a MIPS directive</a:t>
-            </a:r>
-          </a:p>
-          <a:p>
-            <a:pPr marL="742950" lvl="1" indent="-285750">
+              <a:rPr lang="en-US" sz="2400" dirty="0"/>
+              <a:t>Otherwise, set $t2 to 0</a:t>
+            </a:r>
+          </a:p>
+        </p:txBody>
+      </p:sp>
+      <p:sp>
+        <p:nvSpPr>
+          <p:cNvPr id="7" name="TextBox 6">
+            <a:extLst>
+              <a:ext uri="{FF2B5EF4-FFF2-40B4-BE49-F238E27FC236}">
+                <a16:creationId xmlns:a16="http://schemas.microsoft.com/office/drawing/2014/main" id="{9A2F9AA0-A140-4D60-9CB8-3D59E713D4AB}"/>
+              </a:ext>
+            </a:extLst>
+          </p:cNvPr>
+          <p:cNvSpPr txBox="1"/>
+          <p:nvPr/>
+        </p:nvSpPr>
+        <p:spPr>
+          <a:xfrm>
+            <a:off x="435314" y="2834264"/>
+            <a:ext cx="7698752" cy="1938992"/>
+          </a:xfrm>
+          <a:prstGeom prst="rect">
+            <a:avLst/>
+          </a:prstGeom>
+        </p:spPr>
+        <p:txBody>
+          <a:bodyPr wrap="square" rtlCol="0">
+            <a:spAutoFit/>
+          </a:bodyPr>
+          <a:lstStyle/>
+          <a:p>
+            <a:r>
+              <a:rPr lang="en-US" sz="2400" u="sng" dirty="0"/>
+              <a:t>To inform a branching decision</a:t>
+            </a:r>
+            <a:r>
+              <a:rPr lang="en-US" sz="2400" dirty="0"/>
+              <a:t>:</a:t>
+            </a:r>
+          </a:p>
+          <a:p>
+            <a:pPr indent="-342900">
               <a:buFont typeface="Arial" panose="020B0604020202020204" pitchFamily="34" charset="0"/>
               <a:buChar char="•"/>
             </a:pPr>
             <a:r>
-              <a:rPr lang="en-US" dirty="0"/>
-              <a:t>Using this will make the “main” label visible to other files (see “Directives” tab under “Help”)</a:t>
-            </a:r>
-          </a:p>
-          <a:p>
-            <a:pPr marL="742950" lvl="1" indent="-285750">
+              <a:rPr lang="en-US" sz="2400" u="sng" dirty="0"/>
+              <a:t>Example</a:t>
+            </a:r>
+            <a:r>
+              <a:rPr lang="en-US" sz="2400" dirty="0"/>
+              <a:t>: </a:t>
+            </a:r>
+          </a:p>
+          <a:p>
+            <a:pPr lvl="1" indent="-342900">
               <a:buFont typeface="Arial" panose="020B0604020202020204" pitchFamily="34" charset="0"/>
               <a:buChar char="•"/>
             </a:pPr>
             <a:r>
-              <a:rPr lang="en-US" dirty="0"/>
-              <a:t>We prepared our MARS settings to jump to the global “main” label when the program starts.</a:t>
-            </a:r>
-            <a:endParaRPr lang="en-US" sz="2000" dirty="0"/>
-          </a:p>
-          <a:p>
-            <a:pPr marL="742950" lvl="1" indent="-285750">
+              <a:rPr lang="en-US" sz="2400" dirty="0" err="1">
+                <a:latin typeface="Consolas" panose="020B0609020204030204" pitchFamily="49" charset="0"/>
+                <a:cs typeface="Consolas" panose="020B0609020204030204" pitchFamily="49" charset="0"/>
+              </a:rPr>
+              <a:t>slt</a:t>
+            </a:r>
+            <a:r>
+              <a:rPr lang="en-US" sz="2400" dirty="0">
+                <a:latin typeface="Consolas" panose="020B0609020204030204" pitchFamily="49" charset="0"/>
+                <a:cs typeface="Consolas" panose="020B0609020204030204" pitchFamily="49" charset="0"/>
+              </a:rPr>
+              <a:t> $t2, $t1, $t0</a:t>
+            </a:r>
+          </a:p>
+          <a:p>
+            <a:pPr lvl="1" indent="-342900">
               <a:buFont typeface="Arial" panose="020B0604020202020204" pitchFamily="34" charset="0"/>
               <a:buChar char="•"/>
             </a:pPr>
-            <a:endParaRPr lang="en-US" sz="2000" dirty="0"/>
+            <a:r>
+              <a:rPr lang="en-US" sz="2400" dirty="0" err="1">
+                <a:latin typeface="Consolas" panose="020B0609020204030204" pitchFamily="49" charset="0"/>
+                <a:cs typeface="Consolas" panose="020B0609020204030204" pitchFamily="49" charset="0"/>
+              </a:rPr>
+              <a:t>beq</a:t>
+            </a:r>
+            <a:r>
+              <a:rPr lang="en-US" sz="2400" dirty="0">
+                <a:latin typeface="Consolas" panose="020B0609020204030204" pitchFamily="49" charset="0"/>
+                <a:cs typeface="Consolas" panose="020B0609020204030204" pitchFamily="49" charset="0"/>
+              </a:rPr>
+              <a:t> $t2, $zero, </a:t>
+            </a:r>
+            <a:r>
+              <a:rPr lang="en-US" sz="2400" dirty="0" err="1">
+                <a:latin typeface="Consolas" panose="020B0609020204030204" pitchFamily="49" charset="0"/>
+                <a:cs typeface="Consolas" panose="020B0609020204030204" pitchFamily="49" charset="0"/>
+              </a:rPr>
+              <a:t>someLabel</a:t>
+            </a:r>
+            <a:endParaRPr lang="en-US" sz="2400" dirty="0">
+              <a:latin typeface="Consolas" panose="020B0609020204030204" pitchFamily="49" charset="0"/>
+              <a:cs typeface="Consolas" panose="020B0609020204030204" pitchFamily="49" charset="0"/>
+            </a:endParaRPr>
+          </a:p>
+          <a:p>
+            <a:pPr lvl="2" indent="-342900">
+              <a:buFont typeface="Arial" panose="020B0604020202020204" pitchFamily="34" charset="0"/>
+              <a:buChar char="•"/>
+            </a:pPr>
+            <a:r>
+              <a:rPr lang="en-US" sz="2400" dirty="0"/>
+              <a:t>Will branch to “</a:t>
+            </a:r>
+            <a:r>
+              <a:rPr lang="en-US" sz="2400" dirty="0" err="1"/>
+              <a:t>someLabel</a:t>
+            </a:r>
+            <a:r>
+              <a:rPr lang="en-US" sz="2400" dirty="0"/>
+              <a:t>” when $t1 ≥ $t0</a:t>
+            </a:r>
           </a:p>
         </p:txBody>
       </p:sp>
     </p:spTree>
     <p:extLst>
       <p:ext uri="{BB962C8B-B14F-4D97-AF65-F5344CB8AC3E}">
-        <p14:creationId xmlns:p14="http://schemas.microsoft.com/office/powerpoint/2010/main" val="1727329280"/>
+        <p14:creationId xmlns:p14="http://schemas.microsoft.com/office/powerpoint/2010/main" val="407526769"/>
       </p:ext>
     </p:extLst>
   </p:cSld>
@@ -6646,17 +6429,17 @@
                   <a:srgbClr val="002060"/>
                 </a:solidFill>
               </a:rPr>
-              <a:t>Lab #1 Highlights: Running an assembled program</a:t>
+              <a:t>Lab #2: Higher/Lower Game</a:t>
             </a:r>
           </a:p>
         </p:txBody>
       </p:sp>
       <p:pic>
         <p:nvPicPr>
-          <p:cNvPr id="3" name="Picture 2" descr="C:\Users\Karin\Google Drive\CS\CS447JB\kmc51_lab1.asm  - MARS 4.5 (Modified by Jarrett Billingsley for CS0447)">
+          <p:cNvPr id="2" name="Picture 1">
             <a:extLst>
               <a:ext uri="{FF2B5EF4-FFF2-40B4-BE49-F238E27FC236}">
-                <a16:creationId xmlns:a16="http://schemas.microsoft.com/office/drawing/2014/main" id="{4BC03CD1-6BED-477B-8176-3CE7DCFD4102}"/>
+                <a16:creationId xmlns:a16="http://schemas.microsoft.com/office/drawing/2014/main" id="{4CF7D8DA-01BD-44AD-ADAD-DFD366447601}"/>
               </a:ext>
             </a:extLst>
           </p:cNvPr>
@@ -6665,61 +6448,28 @@
           </p:cNvPicPr>
           <p:nvPr/>
         </p:nvPicPr>
-        <p:blipFill rotWithShape="1">
-          <a:blip r:embed="rId2">
-            <a:extLst>
-              <a:ext uri="{28A0092B-C50C-407E-A947-70E740481C1C}">
-                <a14:useLocalDpi xmlns:a14="http://schemas.microsoft.com/office/drawing/2010/main" val="0"/>
-              </a:ext>
-            </a:extLst>
-          </a:blip>
-          <a:srcRect t="2437" r="34166" b="87007"/>
-          <a:stretch/>
+        <p:blipFill>
+          <a:blip r:embed="rId2"/>
+          <a:stretch>
+            <a:fillRect/>
+          </a:stretch>
         </p:blipFill>
         <p:spPr>
           <a:xfrm>
-            <a:off x="401444" y="681112"/>
-            <a:ext cx="8138160" cy="707349"/>
+            <a:off x="182880" y="626325"/>
+            <a:ext cx="4389120" cy="4810860"/>
           </a:xfrm>
           <a:prstGeom prst="rect">
             <a:avLst/>
           </a:prstGeom>
-          <a:solidFill>
-            <a:srgbClr val="FFFFFF">
-              <a:shade val="85000"/>
-            </a:srgbClr>
-          </a:solidFill>
-          <a:ln w="88900" cap="sq">
-            <a:noFill/>
-            <a:miter lim="800000"/>
-          </a:ln>
-          <a:effectLst>
-            <a:outerShdw blurRad="55000" dist="18000" dir="5400000" algn="tl" rotWithShape="0">
-              <a:srgbClr val="000000">
-                <a:alpha val="40000"/>
-              </a:srgbClr>
-            </a:outerShdw>
-          </a:effectLst>
-          <a:scene3d>
-            <a:camera prst="orthographicFront"/>
-            <a:lightRig rig="twoPt" dir="t">
-              <a:rot lat="0" lon="0" rev="7200000"/>
-            </a:lightRig>
-          </a:scene3d>
-          <a:sp3d>
-            <a:bevelT w="25400" h="19050"/>
-            <a:contourClr>
-              <a:srgbClr val="FFFFFF"/>
-            </a:contourClr>
-          </a:sp3d>
         </p:spPr>
       </p:pic>
       <p:sp>
         <p:nvSpPr>
-          <p:cNvPr id="12" name="TextBox 11">
+          <p:cNvPr id="3" name="TextBox 2">
             <a:extLst>
               <a:ext uri="{FF2B5EF4-FFF2-40B4-BE49-F238E27FC236}">
-                <a16:creationId xmlns:a16="http://schemas.microsoft.com/office/drawing/2014/main" id="{31E97653-74D7-478F-B566-AB57234D6778}"/>
+                <a16:creationId xmlns:a16="http://schemas.microsoft.com/office/drawing/2014/main" id="{2EDC4110-F466-4599-AB47-C421A4291748}"/>
               </a:ext>
             </a:extLst>
           </p:cNvPr>
@@ -6728,8 +6478,8 @@
         </p:nvSpPr>
         <p:spPr>
           <a:xfrm>
-            <a:off x="802888" y="1784195"/>
-            <a:ext cx="6958361" cy="3231654"/>
+            <a:off x="4939991" y="261610"/>
+            <a:ext cx="3735659" cy="5940088"/>
           </a:xfrm>
           <a:prstGeom prst="rect">
             <a:avLst/>
@@ -6743,61 +6493,71 @@
           <a:lstStyle/>
           <a:p>
             <a:r>
+              <a:rPr lang="en-US" sz="2400" dirty="0"/>
+              <a:t>General requirements: </a:t>
+            </a:r>
+          </a:p>
+          <a:p>
+            <a:endParaRPr lang="en-US" sz="2400" dirty="0"/>
+          </a:p>
+          <a:p>
+            <a:pPr marL="457200" indent="-457200">
+              <a:buFont typeface="+mj-lt"/>
+              <a:buAutoNum type="arabicPeriod"/>
+            </a:pPr>
+            <a:r>
               <a:rPr lang="en-US" sz="2200" dirty="0"/>
-              <a:t>Wrench: assemble</a:t>
-            </a:r>
-          </a:p>
-          <a:p>
-            <a:endParaRPr lang="en-US" sz="2200" dirty="0"/>
-          </a:p>
-          <a:p>
-            <a:r>
-              <a:rPr lang="en-US" sz="2200" dirty="0"/>
-              <a:t>Green arrow button: Run to completion</a:t>
-            </a:r>
-          </a:p>
-          <a:p>
-            <a:endParaRPr lang="en-US" sz="2200" dirty="0"/>
-          </a:p>
-          <a:p>
-            <a:r>
-              <a:rPr lang="en-US" sz="2200" dirty="0"/>
-              <a:t>Make note of the other green arrow buttons:</a:t>
-            </a:r>
-          </a:p>
-          <a:p>
-            <a:pPr marL="342900" indent="-342900">
-              <a:buFont typeface="Arial" panose="020B0604020202020204" pitchFamily="34" charset="0"/>
-              <a:buChar char="•"/>
-            </a:pPr>
-            <a:r>
-              <a:rPr lang="en-US" dirty="0"/>
-              <a:t>Button with the “1” subscript allows you to step through instructions 1 at a time (very helpful for debugging)</a:t>
-            </a:r>
-          </a:p>
-          <a:p>
-            <a:pPr marL="342900" indent="-342900">
-              <a:buFont typeface="Arial" panose="020B0604020202020204" pitchFamily="34" charset="0"/>
-              <a:buChar char="•"/>
-            </a:pPr>
-            <a:r>
-              <a:rPr lang="en-US" dirty="0"/>
-              <a:t>Other buttons will allow you to move through the program backwards.</a:t>
-            </a:r>
-          </a:p>
-          <a:p>
-            <a:pPr marL="342900" indent="-342900">
-              <a:buFont typeface="Arial" panose="020B0604020202020204" pitchFamily="34" charset="0"/>
-              <a:buChar char="•"/>
+              <a:t>Generate a random number between 0-9 (inclusive)</a:t>
+            </a:r>
+          </a:p>
+          <a:p>
+            <a:pPr marL="457200" indent="-457200">
+              <a:buFont typeface="+mj-lt"/>
+              <a:buAutoNum type="arabicPeriod"/>
             </a:pPr>
             <a:endParaRPr lang="en-US" sz="2200" dirty="0"/>
+          </a:p>
+          <a:p>
+            <a:pPr marL="457200" indent="-457200">
+              <a:buFont typeface="+mj-lt"/>
+              <a:buAutoNum type="arabicPeriod"/>
+            </a:pPr>
+            <a:r>
+              <a:rPr lang="en-US" sz="2200" dirty="0"/>
+              <a:t>Give the user up to three opportunities to guess the correct number, using the messages provided in the example runs. </a:t>
+            </a:r>
+          </a:p>
+          <a:p>
+            <a:pPr marL="457200" indent="-457200">
+              <a:buFont typeface="+mj-lt"/>
+              <a:buAutoNum type="arabicPeriod"/>
+            </a:pPr>
+            <a:endParaRPr lang="en-US" sz="2200" dirty="0"/>
+          </a:p>
+          <a:p>
+            <a:pPr marL="457200" indent="-457200">
+              <a:buFont typeface="+mj-lt"/>
+              <a:buAutoNum type="arabicPeriod"/>
+            </a:pPr>
+            <a:r>
+              <a:rPr lang="en-US" sz="2200" dirty="0"/>
+              <a:t>Terminate the program when the number is correctly guessed, or after three guesses.</a:t>
+            </a:r>
+            <a:endParaRPr lang="en-US" sz="2400" dirty="0"/>
+          </a:p>
+          <a:p>
+            <a:pPr marL="457200" indent="-457200">
+              <a:buFont typeface="+mj-lt"/>
+              <a:buAutoNum type="arabicPeriod"/>
+            </a:pPr>
+            <a:endParaRPr lang="en-US" sz="2400" dirty="0"/>
           </a:p>
         </p:txBody>
       </p:sp>
     </p:spTree>
     <p:extLst>
       <p:ext uri="{BB962C8B-B14F-4D97-AF65-F5344CB8AC3E}">
-        <p14:creationId xmlns:p14="http://schemas.microsoft.com/office/powerpoint/2010/main" val="4023486359"/>
+        <p14:creationId xmlns:p14="http://schemas.microsoft.com/office/powerpoint/2010/main" val="2401262578"/>
       </p:ext>
     </p:extLst>
   </p:cSld>

</xml_diff>